<commit_message>
vault backup: 2025-01-22 23:50:31
</commit_message>
<xml_diff>
--- a/Coffee Roaster Project.pptx
+++ b/Coffee Roaster Project.pptx
@@ -8,9 +8,10 @@
     <p:sldId id="256" r:id="rId2"/>
     <p:sldId id="257" r:id="rId3"/>
     <p:sldId id="258" r:id="rId4"/>
-    <p:sldId id="261" r:id="rId5"/>
-    <p:sldId id="259" r:id="rId6"/>
-    <p:sldId id="260" r:id="rId7"/>
+    <p:sldId id="262" r:id="rId5"/>
+    <p:sldId id="261" r:id="rId6"/>
+    <p:sldId id="259" r:id="rId7"/>
+    <p:sldId id="260" r:id="rId8"/>
   </p:sldIdLst>
   <p:sldSz cx="12192000" cy="6858000"/>
   <p:notesSz cx="6858000" cy="9144000"/>
@@ -109,6 +110,11 @@
       </a:defRPr>
     </a:lvl9pPr>
   </p:defaultTextStyle>
+  <p:extLst>
+    <p:ext uri="{EFAFB233-063F-42B5-8137-9DF3F51BA10A}">
+      <p15:sldGuideLst xmlns:p15="http://schemas.microsoft.com/office/powerpoint/2012/main"/>
+    </p:ext>
+  </p:extLst>
 </p:presentation>
 </file>
 
@@ -261,7 +267,7 @@
           <a:p>
             <a:fld id="{82BBC883-D9E8-416A-ABFC-C220163C9981}" type="datetimeFigureOut">
               <a:rPr lang="zh-TW" altLang="en-US" smtClean="0"/>
-              <a:t>2025/1/18</a:t>
+              <a:t>2025/1/22</a:t>
             </a:fld>
             <a:endParaRPr lang="zh-TW" altLang="en-US"/>
           </a:p>
@@ -461,7 +467,7 @@
           <a:p>
             <a:fld id="{82BBC883-D9E8-416A-ABFC-C220163C9981}" type="datetimeFigureOut">
               <a:rPr lang="zh-TW" altLang="en-US" smtClean="0"/>
-              <a:t>2025/1/18</a:t>
+              <a:t>2025/1/22</a:t>
             </a:fld>
             <a:endParaRPr lang="zh-TW" altLang="en-US"/>
           </a:p>
@@ -671,7 +677,7 @@
           <a:p>
             <a:fld id="{82BBC883-D9E8-416A-ABFC-C220163C9981}" type="datetimeFigureOut">
               <a:rPr lang="zh-TW" altLang="en-US" smtClean="0"/>
-              <a:t>2025/1/18</a:t>
+              <a:t>2025/1/22</a:t>
             </a:fld>
             <a:endParaRPr lang="zh-TW" altLang="en-US"/>
           </a:p>
@@ -871,7 +877,7 @@
           <a:p>
             <a:fld id="{82BBC883-D9E8-416A-ABFC-C220163C9981}" type="datetimeFigureOut">
               <a:rPr lang="zh-TW" altLang="en-US" smtClean="0"/>
-              <a:t>2025/1/18</a:t>
+              <a:t>2025/1/22</a:t>
             </a:fld>
             <a:endParaRPr lang="zh-TW" altLang="en-US"/>
           </a:p>
@@ -1147,7 +1153,7 @@
           <a:p>
             <a:fld id="{82BBC883-D9E8-416A-ABFC-C220163C9981}" type="datetimeFigureOut">
               <a:rPr lang="zh-TW" altLang="en-US" smtClean="0"/>
-              <a:t>2025/1/18</a:t>
+              <a:t>2025/1/22</a:t>
             </a:fld>
             <a:endParaRPr lang="zh-TW" altLang="en-US"/>
           </a:p>
@@ -1415,7 +1421,7 @@
           <a:p>
             <a:fld id="{82BBC883-D9E8-416A-ABFC-C220163C9981}" type="datetimeFigureOut">
               <a:rPr lang="zh-TW" altLang="en-US" smtClean="0"/>
-              <a:t>2025/1/18</a:t>
+              <a:t>2025/1/22</a:t>
             </a:fld>
             <a:endParaRPr lang="zh-TW" altLang="en-US"/>
           </a:p>
@@ -1830,7 +1836,7 @@
           <a:p>
             <a:fld id="{82BBC883-D9E8-416A-ABFC-C220163C9981}" type="datetimeFigureOut">
               <a:rPr lang="zh-TW" altLang="en-US" smtClean="0"/>
-              <a:t>2025/1/18</a:t>
+              <a:t>2025/1/22</a:t>
             </a:fld>
             <a:endParaRPr lang="zh-TW" altLang="en-US"/>
           </a:p>
@@ -1972,7 +1978,7 @@
           <a:p>
             <a:fld id="{82BBC883-D9E8-416A-ABFC-C220163C9981}" type="datetimeFigureOut">
               <a:rPr lang="zh-TW" altLang="en-US" smtClean="0"/>
-              <a:t>2025/1/18</a:t>
+              <a:t>2025/1/22</a:t>
             </a:fld>
             <a:endParaRPr lang="zh-TW" altLang="en-US"/>
           </a:p>
@@ -2085,7 +2091,7 @@
           <a:p>
             <a:fld id="{82BBC883-D9E8-416A-ABFC-C220163C9981}" type="datetimeFigureOut">
               <a:rPr lang="zh-TW" altLang="en-US" smtClean="0"/>
-              <a:t>2025/1/18</a:t>
+              <a:t>2025/1/22</a:t>
             </a:fld>
             <a:endParaRPr lang="zh-TW" altLang="en-US"/>
           </a:p>
@@ -2398,7 +2404,7 @@
           <a:p>
             <a:fld id="{82BBC883-D9E8-416A-ABFC-C220163C9981}" type="datetimeFigureOut">
               <a:rPr lang="zh-TW" altLang="en-US" smtClean="0"/>
-              <a:t>2025/1/18</a:t>
+              <a:t>2025/1/22</a:t>
             </a:fld>
             <a:endParaRPr lang="zh-TW" altLang="en-US"/>
           </a:p>
@@ -2687,7 +2693,7 @@
           <a:p>
             <a:fld id="{82BBC883-D9E8-416A-ABFC-C220163C9981}" type="datetimeFigureOut">
               <a:rPr lang="zh-TW" altLang="en-US" smtClean="0"/>
-              <a:t>2025/1/18</a:t>
+              <a:t>2025/1/22</a:t>
             </a:fld>
             <a:endParaRPr lang="zh-TW" altLang="en-US"/>
           </a:p>
@@ -2930,7 +2936,7 @@
           <a:p>
             <a:fld id="{82BBC883-D9E8-416A-ABFC-C220163C9981}" type="datetimeFigureOut">
               <a:rPr lang="zh-TW" altLang="en-US" smtClean="0"/>
-              <a:t>2025/1/18</a:t>
+              <a:t>2025/1/22</a:t>
             </a:fld>
             <a:endParaRPr lang="zh-TW" altLang="en-US"/>
           </a:p>
@@ -4293,6 +4299,2861 @@
         <p:cNvPr id="1" name="">
           <a:extLst>
             <a:ext uri="{FF2B5EF4-FFF2-40B4-BE49-F238E27FC236}">
+              <a16:creationId xmlns:a16="http://schemas.microsoft.com/office/drawing/2014/main" id="{A162D6FD-51C1-83C0-2910-FA6FF94BE8BC}"/>
+            </a:ext>
+          </a:extLst>
+        </p:cNvPr>
+        <p:cNvGrpSpPr/>
+        <p:nvPr/>
+      </p:nvGrpSpPr>
+      <p:grpSpPr>
+        <a:xfrm>
+          <a:off x="0" y="0"/>
+          <a:ext cx="0" cy="0"/>
+          <a:chOff x="0" y="0"/>
+          <a:chExt cx="0" cy="0"/>
+        </a:xfrm>
+      </p:grpSpPr>
+      <p:sp>
+        <p:nvSpPr>
+          <p:cNvPr id="2" name="Title 1">
+            <a:extLst>
+              <a:ext uri="{FF2B5EF4-FFF2-40B4-BE49-F238E27FC236}">
+                <a16:creationId xmlns:a16="http://schemas.microsoft.com/office/drawing/2014/main" id="{24FEA24A-AEB7-1E8A-2DE2-4B8176618D8E}"/>
+              </a:ext>
+            </a:extLst>
+          </p:cNvPr>
+          <p:cNvSpPr>
+            <a:spLocks noGrp="1"/>
+          </p:cNvSpPr>
+          <p:nvPr>
+            <p:ph type="title"/>
+          </p:nvPr>
+        </p:nvSpPr>
+        <p:spPr/>
+        <p:txBody>
+          <a:bodyPr/>
+          <a:lstStyle/>
+          <a:p>
+            <a:r>
+              <a:rPr lang="en-US" altLang="zh-TW" dirty="0"/>
+              <a:t>Flow</a:t>
+            </a:r>
+            <a:endParaRPr lang="zh-TW" altLang="en-US" dirty="0"/>
+          </a:p>
+        </p:txBody>
+      </p:sp>
+      <p:pic>
+        <p:nvPicPr>
+          <p:cNvPr id="1028" name="Picture 4" descr="What is Bluetooth? The streaming technology explained">
+            <a:extLst>
+              <a:ext uri="{FF2B5EF4-FFF2-40B4-BE49-F238E27FC236}">
+                <a16:creationId xmlns:a16="http://schemas.microsoft.com/office/drawing/2014/main" id="{DF59AE82-640A-1290-BE47-6A5E15D31E46}"/>
+              </a:ext>
+            </a:extLst>
+          </p:cNvPr>
+          <p:cNvPicPr>
+            <a:picLocks noChangeAspect="1" noChangeArrowheads="1"/>
+          </p:cNvPicPr>
+          <p:nvPr/>
+        </p:nvPicPr>
+        <p:blipFill>
+          <a:blip r:embed="rId2">
+            <a:extLst>
+              <a:ext uri="{28A0092B-C50C-407E-A947-70E740481C1C}">
+                <a14:useLocalDpi xmlns:a14="http://schemas.microsoft.com/office/drawing/2010/main" val="0"/>
+              </a:ext>
+            </a:extLst>
+          </a:blip>
+          <a:srcRect/>
+          <a:stretch>
+            <a:fillRect/>
+          </a:stretch>
+        </p:blipFill>
+        <p:spPr bwMode="auto">
+          <a:xfrm>
+            <a:off x="3068126" y="3149398"/>
+            <a:ext cx="502769" cy="301661"/>
+          </a:xfrm>
+          <a:prstGeom prst="rect">
+            <a:avLst/>
+          </a:prstGeom>
+          <a:noFill/>
+          <a:extLst>
+            <a:ext uri="{909E8E84-426E-40DD-AFC4-6F175D3DCCD1}">
+              <a14:hiddenFill xmlns:a14="http://schemas.microsoft.com/office/drawing/2010/main">
+                <a:solidFill>
+                  <a:srgbClr val="FFFFFF"/>
+                </a:solidFill>
+              </a14:hiddenFill>
+            </a:ext>
+          </a:extLst>
+        </p:spPr>
+      </p:pic>
+      <p:cxnSp>
+        <p:nvCxnSpPr>
+          <p:cNvPr id="22" name="Straight Arrow Connector 21">
+            <a:extLst>
+              <a:ext uri="{FF2B5EF4-FFF2-40B4-BE49-F238E27FC236}">
+                <a16:creationId xmlns:a16="http://schemas.microsoft.com/office/drawing/2014/main" id="{5DA6E410-4FB2-B635-542B-D6688ECC6450}"/>
+              </a:ext>
+            </a:extLst>
+          </p:cNvPr>
+          <p:cNvCxnSpPr>
+            <a:cxnSpLocks/>
+          </p:cNvCxnSpPr>
+          <p:nvPr/>
+        </p:nvCxnSpPr>
+        <p:spPr>
+          <a:xfrm flipV="1">
+            <a:off x="2678144" y="2761354"/>
+            <a:ext cx="1091033" cy="538875"/>
+          </a:xfrm>
+          <a:prstGeom prst="straightConnector1">
+            <a:avLst/>
+          </a:prstGeom>
+          <a:ln>
+            <a:tailEnd type="triangle"/>
+          </a:ln>
+        </p:spPr>
+        <p:style>
+          <a:lnRef idx="2">
+            <a:schemeClr val="accent1"/>
+          </a:lnRef>
+          <a:fillRef idx="0">
+            <a:schemeClr val="accent1"/>
+          </a:fillRef>
+          <a:effectRef idx="1">
+            <a:schemeClr val="accent1"/>
+          </a:effectRef>
+          <a:fontRef idx="minor">
+            <a:schemeClr val="tx1"/>
+          </a:fontRef>
+        </p:style>
+      </p:cxnSp>
+      <p:grpSp>
+        <p:nvGrpSpPr>
+          <p:cNvPr id="3" name="Group 2">
+            <a:extLst>
+              <a:ext uri="{FF2B5EF4-FFF2-40B4-BE49-F238E27FC236}">
+                <a16:creationId xmlns:a16="http://schemas.microsoft.com/office/drawing/2014/main" id="{48762B72-ECD0-9CC7-6F7D-475EB77B935C}"/>
+              </a:ext>
+            </a:extLst>
+          </p:cNvPr>
+          <p:cNvGrpSpPr/>
+          <p:nvPr/>
+        </p:nvGrpSpPr>
+        <p:grpSpPr>
+          <a:xfrm>
+            <a:off x="505627" y="2843614"/>
+            <a:ext cx="2172517" cy="1010780"/>
+            <a:chOff x="1590584" y="2805740"/>
+            <a:chExt cx="3928819" cy="2367253"/>
+          </a:xfrm>
+        </p:grpSpPr>
+        <p:grpSp>
+          <p:nvGrpSpPr>
+            <p:cNvPr id="12" name="Group 11">
+              <a:extLst>
+                <a:ext uri="{FF2B5EF4-FFF2-40B4-BE49-F238E27FC236}">
+                  <a16:creationId xmlns:a16="http://schemas.microsoft.com/office/drawing/2014/main" id="{80A8E08D-2B81-0367-9A55-9A97274002B8}"/>
+                </a:ext>
+              </a:extLst>
+            </p:cNvPr>
+            <p:cNvGrpSpPr/>
+            <p:nvPr/>
+          </p:nvGrpSpPr>
+          <p:grpSpPr>
+            <a:xfrm>
+              <a:off x="3737495" y="2805740"/>
+              <a:ext cx="1781908" cy="2367253"/>
+              <a:chOff x="4104664" y="2512480"/>
+              <a:chExt cx="1781908" cy="2367253"/>
+            </a:xfrm>
+          </p:grpSpPr>
+          <p:pic>
+            <p:nvPicPr>
+              <p:cNvPr id="5" name="Picture 4">
+                <a:extLst>
+                  <a:ext uri="{FF2B5EF4-FFF2-40B4-BE49-F238E27FC236}">
+                    <a16:creationId xmlns:a16="http://schemas.microsoft.com/office/drawing/2014/main" id="{02F9B7E1-108F-34B2-489E-BC1B00AFB111}"/>
+                  </a:ext>
+                </a:extLst>
+              </p:cNvPr>
+              <p:cNvPicPr>
+                <a:picLocks noChangeAspect="1"/>
+              </p:cNvPicPr>
+              <p:nvPr/>
+            </p:nvPicPr>
+            <p:blipFill>
+              <a:blip r:embed="rId3"/>
+              <a:stretch>
+                <a:fillRect/>
+              </a:stretch>
+            </p:blipFill>
+            <p:spPr>
+              <a:xfrm rot="16200000">
+                <a:off x="3996659" y="2899209"/>
+                <a:ext cx="1997922" cy="1224463"/>
+              </a:xfrm>
+              <a:prstGeom prst="rect">
+                <a:avLst/>
+              </a:prstGeom>
+            </p:spPr>
+          </p:pic>
+          <p:sp>
+            <p:nvSpPr>
+              <p:cNvPr id="8" name="TextBox 7">
+                <a:extLst>
+                  <a:ext uri="{FF2B5EF4-FFF2-40B4-BE49-F238E27FC236}">
+                    <a16:creationId xmlns:a16="http://schemas.microsoft.com/office/drawing/2014/main" id="{19D9D3BA-81C5-9522-7DE3-7C6CB15EF666}"/>
+                  </a:ext>
+                </a:extLst>
+              </p:cNvPr>
+              <p:cNvSpPr txBox="1"/>
+              <p:nvPr/>
+            </p:nvSpPr>
+            <p:spPr>
+              <a:xfrm>
+                <a:off x="4104664" y="4510401"/>
+                <a:ext cx="1781908" cy="369332"/>
+              </a:xfrm>
+              <a:prstGeom prst="rect">
+                <a:avLst/>
+              </a:prstGeom>
+              <a:noFill/>
+            </p:spPr>
+            <p:txBody>
+              <a:bodyPr wrap="square" rtlCol="0">
+                <a:spAutoFit/>
+              </a:bodyPr>
+              <a:lstStyle/>
+              <a:p>
+                <a:pPr algn="ctr"/>
+                <a:r>
+                  <a:rPr lang="en-US" altLang="zh-TW" dirty="0"/>
+                  <a:t>ESP32s</a:t>
+                </a:r>
+                <a:endParaRPr lang="zh-TW" altLang="en-US" dirty="0"/>
+              </a:p>
+            </p:txBody>
+          </p:sp>
+        </p:grpSp>
+        <p:grpSp>
+          <p:nvGrpSpPr>
+            <p:cNvPr id="13" name="Group 12">
+              <a:extLst>
+                <a:ext uri="{FF2B5EF4-FFF2-40B4-BE49-F238E27FC236}">
+                  <a16:creationId xmlns:a16="http://schemas.microsoft.com/office/drawing/2014/main" id="{7F5C2E39-342C-C023-83A3-134BE00F6CFB}"/>
+                </a:ext>
+              </a:extLst>
+            </p:cNvPr>
+            <p:cNvGrpSpPr/>
+            <p:nvPr/>
+          </p:nvGrpSpPr>
+          <p:grpSpPr>
+            <a:xfrm>
+              <a:off x="1590584" y="3473881"/>
+              <a:ext cx="2258523" cy="1514448"/>
+              <a:chOff x="1277815" y="3212855"/>
+              <a:chExt cx="2258523" cy="1514448"/>
+            </a:xfrm>
+          </p:grpSpPr>
+          <p:pic>
+            <p:nvPicPr>
+              <p:cNvPr id="1026" name="Picture 2">
+                <a:extLst>
+                  <a:ext uri="{FF2B5EF4-FFF2-40B4-BE49-F238E27FC236}">
+                    <a16:creationId xmlns:a16="http://schemas.microsoft.com/office/drawing/2014/main" id="{BAF3EAD9-8FC6-A121-E121-961A807601A5}"/>
+                  </a:ext>
+                </a:extLst>
+              </p:cNvPr>
+              <p:cNvPicPr>
+                <a:picLocks noChangeAspect="1" noChangeArrowheads="1"/>
+              </p:cNvPicPr>
+              <p:nvPr/>
+            </p:nvPicPr>
+            <p:blipFill>
+              <a:blip r:embed="rId4">
+                <a:extLst>
+                  <a:ext uri="{28A0092B-C50C-407E-A947-70E740481C1C}">
+                    <a14:useLocalDpi xmlns:a14="http://schemas.microsoft.com/office/drawing/2010/main" val="0"/>
+                  </a:ext>
+                </a:extLst>
+              </a:blip>
+              <a:srcRect/>
+              <a:stretch>
+                <a:fillRect/>
+              </a:stretch>
+            </p:blipFill>
+            <p:spPr bwMode="auto">
+              <a:xfrm>
+                <a:off x="1277815" y="3212855"/>
+                <a:ext cx="2258523" cy="1050316"/>
+              </a:xfrm>
+              <a:prstGeom prst="rect">
+                <a:avLst/>
+              </a:prstGeom>
+              <a:noFill/>
+              <a:extLst>
+                <a:ext uri="{909E8E84-426E-40DD-AFC4-6F175D3DCCD1}">
+                  <a14:hiddenFill xmlns:a14="http://schemas.microsoft.com/office/drawing/2010/main">
+                    <a:solidFill>
+                      <a:srgbClr val="FFFFFF"/>
+                    </a:solidFill>
+                  </a14:hiddenFill>
+                </a:ext>
+              </a:extLst>
+            </p:spPr>
+          </p:pic>
+          <p:sp>
+            <p:nvSpPr>
+              <p:cNvPr id="9" name="TextBox 8">
+                <a:extLst>
+                  <a:ext uri="{FF2B5EF4-FFF2-40B4-BE49-F238E27FC236}">
+                    <a16:creationId xmlns:a16="http://schemas.microsoft.com/office/drawing/2014/main" id="{09957CA5-CFDF-D14D-298D-97D7F3785541}"/>
+                  </a:ext>
+                </a:extLst>
+              </p:cNvPr>
+              <p:cNvSpPr txBox="1"/>
+              <p:nvPr/>
+            </p:nvSpPr>
+            <p:spPr>
+              <a:xfrm>
+                <a:off x="1516122" y="4357971"/>
+                <a:ext cx="1781908" cy="369332"/>
+              </a:xfrm>
+              <a:prstGeom prst="rect">
+                <a:avLst/>
+              </a:prstGeom>
+              <a:noFill/>
+            </p:spPr>
+            <p:txBody>
+              <a:bodyPr wrap="square" rtlCol="0">
+                <a:spAutoFit/>
+              </a:bodyPr>
+              <a:lstStyle/>
+              <a:p>
+                <a:pPr algn="ctr"/>
+                <a:r>
+                  <a:rPr lang="en-US" altLang="zh-TW" dirty="0"/>
+                  <a:t>MAX 6675</a:t>
+                </a:r>
+                <a:endParaRPr lang="zh-TW" altLang="en-US" dirty="0"/>
+              </a:p>
+            </p:txBody>
+          </p:sp>
+        </p:grpSp>
+        <p:cxnSp>
+          <p:nvCxnSpPr>
+            <p:cNvPr id="31" name="Straight Connector 30">
+              <a:extLst>
+                <a:ext uri="{FF2B5EF4-FFF2-40B4-BE49-F238E27FC236}">
+                  <a16:creationId xmlns:a16="http://schemas.microsoft.com/office/drawing/2014/main" id="{F0C5E24F-8ED7-BB34-15D0-D08707513B1B}"/>
+                </a:ext>
+              </a:extLst>
+            </p:cNvPr>
+            <p:cNvCxnSpPr>
+              <a:cxnSpLocks/>
+            </p:cNvCxnSpPr>
+            <p:nvPr/>
+          </p:nvCxnSpPr>
+          <p:spPr>
+            <a:xfrm>
+              <a:off x="3700738" y="3999039"/>
+              <a:ext cx="551408" cy="0"/>
+            </a:xfrm>
+            <a:prstGeom prst="line">
+              <a:avLst/>
+            </a:prstGeom>
+            <a:ln>
+              <a:solidFill>
+                <a:srgbClr val="C00000"/>
+              </a:solidFill>
+            </a:ln>
+          </p:spPr>
+          <p:style>
+            <a:lnRef idx="2">
+              <a:schemeClr val="accent1"/>
+            </a:lnRef>
+            <a:fillRef idx="0">
+              <a:schemeClr val="accent1"/>
+            </a:fillRef>
+            <a:effectRef idx="1">
+              <a:schemeClr val="accent1"/>
+            </a:effectRef>
+            <a:fontRef idx="minor">
+              <a:schemeClr val="tx1"/>
+            </a:fontRef>
+          </p:style>
+        </p:cxnSp>
+      </p:grpSp>
+      <p:sp>
+        <p:nvSpPr>
+          <p:cNvPr id="7" name="TextBox 6">
+            <a:extLst>
+              <a:ext uri="{FF2B5EF4-FFF2-40B4-BE49-F238E27FC236}">
+                <a16:creationId xmlns:a16="http://schemas.microsoft.com/office/drawing/2014/main" id="{86F1E6B8-A378-2A23-6C38-B3A2C0EF44F6}"/>
+              </a:ext>
+            </a:extLst>
+          </p:cNvPr>
+          <p:cNvSpPr txBox="1"/>
+          <p:nvPr/>
+        </p:nvSpPr>
+        <p:spPr>
+          <a:xfrm>
+            <a:off x="2616428" y="2712808"/>
+            <a:ext cx="859536" cy="261610"/>
+          </a:xfrm>
+          <a:prstGeom prst="rect">
+            <a:avLst/>
+          </a:prstGeom>
+          <a:noFill/>
+        </p:spPr>
+        <p:txBody>
+          <a:bodyPr wrap="square" rtlCol="0">
+            <a:spAutoFit/>
+          </a:bodyPr>
+          <a:lstStyle/>
+          <a:p>
+            <a:r>
+              <a:rPr lang="en-US" altLang="zh-TW" sz="1100" dirty="0"/>
+              <a:t>MSG: 23 °C</a:t>
+            </a:r>
+            <a:endParaRPr lang="zh-TW" altLang="en-US" sz="1100" dirty="0"/>
+          </a:p>
+        </p:txBody>
+      </p:sp>
+      <p:sp>
+        <p:nvSpPr>
+          <p:cNvPr id="17" name="Rectangle 16">
+            <a:extLst>
+              <a:ext uri="{FF2B5EF4-FFF2-40B4-BE49-F238E27FC236}">
+                <a16:creationId xmlns:a16="http://schemas.microsoft.com/office/drawing/2014/main" id="{AA5AC79E-7031-4D4F-0121-A85B43065E06}"/>
+              </a:ext>
+            </a:extLst>
+          </p:cNvPr>
+          <p:cNvSpPr/>
+          <p:nvPr/>
+        </p:nvSpPr>
+        <p:spPr>
+          <a:xfrm>
+            <a:off x="4386072" y="2087274"/>
+            <a:ext cx="798576" cy="359752"/>
+          </a:xfrm>
+          <a:prstGeom prst="rect">
+            <a:avLst/>
+          </a:prstGeom>
+        </p:spPr>
+        <p:style>
+          <a:lnRef idx="2">
+            <a:schemeClr val="accent1">
+              <a:shade val="15000"/>
+            </a:schemeClr>
+          </a:lnRef>
+          <a:fillRef idx="1">
+            <a:schemeClr val="accent1"/>
+          </a:fillRef>
+          <a:effectRef idx="0">
+            <a:schemeClr val="accent1"/>
+          </a:effectRef>
+          <a:fontRef idx="minor">
+            <a:schemeClr val="lt1"/>
+          </a:fontRef>
+        </p:style>
+        <p:txBody>
+          <a:bodyPr rtlCol="0" anchor="ctr"/>
+          <a:lstStyle/>
+          <a:p>
+            <a:pPr algn="ctr"/>
+            <a:r>
+              <a:rPr lang="en-US" altLang="zh-TW" sz="1000" dirty="0"/>
+              <a:t>Bluetooth Adapter</a:t>
+            </a:r>
+            <a:endParaRPr lang="zh-TW" altLang="en-US" sz="1000" dirty="0"/>
+          </a:p>
+        </p:txBody>
+      </p:sp>
+      <p:sp>
+        <p:nvSpPr>
+          <p:cNvPr id="19" name="Rectangle 18">
+            <a:extLst>
+              <a:ext uri="{FF2B5EF4-FFF2-40B4-BE49-F238E27FC236}">
+                <a16:creationId xmlns:a16="http://schemas.microsoft.com/office/drawing/2014/main" id="{8580E31B-8E6F-0F52-828E-F14D4D2F11D8}"/>
+              </a:ext>
+            </a:extLst>
+          </p:cNvPr>
+          <p:cNvSpPr/>
+          <p:nvPr/>
+        </p:nvSpPr>
+        <p:spPr>
+          <a:xfrm>
+            <a:off x="4386834" y="2663736"/>
+            <a:ext cx="798576" cy="359752"/>
+          </a:xfrm>
+          <a:prstGeom prst="rect">
+            <a:avLst/>
+          </a:prstGeom>
+          <a:solidFill>
+            <a:schemeClr val="accent2"/>
+          </a:solidFill>
+        </p:spPr>
+        <p:style>
+          <a:lnRef idx="2">
+            <a:schemeClr val="accent1">
+              <a:shade val="15000"/>
+            </a:schemeClr>
+          </a:lnRef>
+          <a:fillRef idx="1">
+            <a:schemeClr val="accent1"/>
+          </a:fillRef>
+          <a:effectRef idx="0">
+            <a:schemeClr val="accent1"/>
+          </a:effectRef>
+          <a:fontRef idx="minor">
+            <a:schemeClr val="lt1"/>
+          </a:fontRef>
+        </p:style>
+        <p:txBody>
+          <a:bodyPr rtlCol="0" anchor="ctr"/>
+          <a:lstStyle/>
+          <a:p>
+            <a:pPr algn="ctr"/>
+            <a:r>
+              <a:rPr lang="en-US" altLang="zh-TW" sz="1000" dirty="0"/>
+              <a:t>Input Stream</a:t>
+            </a:r>
+            <a:endParaRPr lang="zh-TW" altLang="en-US" sz="1000" dirty="0"/>
+          </a:p>
+        </p:txBody>
+      </p:sp>
+      <p:sp>
+        <p:nvSpPr>
+          <p:cNvPr id="18" name="Rectangle 17">
+            <a:extLst>
+              <a:ext uri="{FF2B5EF4-FFF2-40B4-BE49-F238E27FC236}">
+                <a16:creationId xmlns:a16="http://schemas.microsoft.com/office/drawing/2014/main" id="{240A5E98-3194-84CA-40B3-9C685BF7E37C}"/>
+              </a:ext>
+            </a:extLst>
+          </p:cNvPr>
+          <p:cNvSpPr/>
+          <p:nvPr/>
+        </p:nvSpPr>
+        <p:spPr>
+          <a:xfrm>
+            <a:off x="4509516" y="2425787"/>
+            <a:ext cx="551688" cy="267904"/>
+          </a:xfrm>
+          <a:prstGeom prst="rect">
+            <a:avLst/>
+          </a:prstGeom>
+          <a:solidFill>
+            <a:srgbClr val="FFFF00"/>
+          </a:solidFill>
+        </p:spPr>
+        <p:style>
+          <a:lnRef idx="2">
+            <a:schemeClr val="accent1">
+              <a:shade val="15000"/>
+            </a:schemeClr>
+          </a:lnRef>
+          <a:fillRef idx="1">
+            <a:schemeClr val="accent1"/>
+          </a:fillRef>
+          <a:effectRef idx="0">
+            <a:schemeClr val="accent1"/>
+          </a:effectRef>
+          <a:fontRef idx="minor">
+            <a:schemeClr val="lt1"/>
+          </a:fontRef>
+        </p:style>
+        <p:txBody>
+          <a:bodyPr rtlCol="0" anchor="ctr"/>
+          <a:lstStyle/>
+          <a:p>
+            <a:pPr algn="ctr"/>
+            <a:r>
+              <a:rPr lang="en-US" altLang="zh-TW" sz="600" dirty="0">
+                <a:solidFill>
+                  <a:schemeClr val="tx2"/>
+                </a:solidFill>
+              </a:rPr>
+              <a:t>Bluetooth Socket</a:t>
+            </a:r>
+            <a:endParaRPr lang="zh-TW" altLang="en-US" sz="600" dirty="0">
+              <a:solidFill>
+                <a:schemeClr val="tx2"/>
+              </a:solidFill>
+            </a:endParaRPr>
+          </a:p>
+        </p:txBody>
+      </p:sp>
+      <p:pic>
+        <p:nvPicPr>
+          <p:cNvPr id="30" name="Picture 4" descr="Wifi和藍牙，都是無線，有什麼差別？ - 歡迎IT專業人士">
+            <a:extLst>
+              <a:ext uri="{FF2B5EF4-FFF2-40B4-BE49-F238E27FC236}">
+                <a16:creationId xmlns:a16="http://schemas.microsoft.com/office/drawing/2014/main" id="{1F01F398-F4AE-9222-7069-D5C9DE573713}"/>
+              </a:ext>
+            </a:extLst>
+          </p:cNvPr>
+          <p:cNvPicPr>
+            <a:picLocks noChangeAspect="1" noChangeArrowheads="1"/>
+          </p:cNvPicPr>
+          <p:nvPr/>
+        </p:nvPicPr>
+        <p:blipFill>
+          <a:blip r:embed="rId5">
+            <a:extLst>
+              <a:ext uri="{28A0092B-C50C-407E-A947-70E740481C1C}">
+                <a14:useLocalDpi xmlns:a14="http://schemas.microsoft.com/office/drawing/2010/main" val="0"/>
+              </a:ext>
+            </a:extLst>
+          </a:blip>
+          <a:srcRect/>
+          <a:stretch>
+            <a:fillRect/>
+          </a:stretch>
+        </p:blipFill>
+        <p:spPr bwMode="auto">
+          <a:xfrm rot="17746806">
+            <a:off x="4017806" y="1866892"/>
+            <a:ext cx="242737" cy="242737"/>
+          </a:xfrm>
+          <a:prstGeom prst="rect">
+            <a:avLst/>
+          </a:prstGeom>
+          <a:noFill/>
+          <a:extLst>
+            <a:ext uri="{909E8E84-426E-40DD-AFC4-6F175D3DCCD1}">
+              <a14:hiddenFill xmlns:a14="http://schemas.microsoft.com/office/drawing/2010/main">
+                <a:solidFill>
+                  <a:srgbClr val="FFFFFF"/>
+                </a:solidFill>
+              </a14:hiddenFill>
+            </a:ext>
+          </a:extLst>
+        </p:spPr>
+      </p:pic>
+      <p:pic>
+        <p:nvPicPr>
+          <p:cNvPr id="32" name="Picture 4" descr="Wifi和藍牙，都是無線，有什麼差別？ - 歡迎IT專業人士">
+            <a:extLst>
+              <a:ext uri="{FF2B5EF4-FFF2-40B4-BE49-F238E27FC236}">
+                <a16:creationId xmlns:a16="http://schemas.microsoft.com/office/drawing/2014/main" id="{531CD30C-C404-930C-A695-BE0D45DDCA94}"/>
+              </a:ext>
+            </a:extLst>
+          </p:cNvPr>
+          <p:cNvPicPr>
+            <a:picLocks noChangeAspect="1" noChangeArrowheads="1"/>
+          </p:cNvPicPr>
+          <p:nvPr/>
+        </p:nvPicPr>
+        <p:blipFill>
+          <a:blip r:embed="rId5">
+            <a:extLst>
+              <a:ext uri="{28A0092B-C50C-407E-A947-70E740481C1C}">
+                <a14:useLocalDpi xmlns:a14="http://schemas.microsoft.com/office/drawing/2010/main" val="0"/>
+              </a:ext>
+            </a:extLst>
+          </a:blip>
+          <a:srcRect/>
+          <a:stretch>
+            <a:fillRect/>
+          </a:stretch>
+        </p:blipFill>
+        <p:spPr bwMode="auto">
+          <a:xfrm rot="2872156">
+            <a:off x="5234706" y="1692852"/>
+            <a:ext cx="242737" cy="242737"/>
+          </a:xfrm>
+          <a:prstGeom prst="rect">
+            <a:avLst/>
+          </a:prstGeom>
+          <a:noFill/>
+          <a:extLst>
+            <a:ext uri="{909E8E84-426E-40DD-AFC4-6F175D3DCCD1}">
+              <a14:hiddenFill xmlns:a14="http://schemas.microsoft.com/office/drawing/2010/main">
+                <a:solidFill>
+                  <a:srgbClr val="FFFFFF"/>
+                </a:solidFill>
+              </a14:hiddenFill>
+            </a:ext>
+          </a:extLst>
+        </p:spPr>
+      </p:pic>
+      <p:sp>
+        <p:nvSpPr>
+          <p:cNvPr id="33" name="TextBox 32">
+            <a:extLst>
+              <a:ext uri="{FF2B5EF4-FFF2-40B4-BE49-F238E27FC236}">
+                <a16:creationId xmlns:a16="http://schemas.microsoft.com/office/drawing/2014/main" id="{77D4E5E5-F0FB-AC90-DE73-12C89949CD1B}"/>
+              </a:ext>
+            </a:extLst>
+          </p:cNvPr>
+          <p:cNvSpPr txBox="1"/>
+          <p:nvPr/>
+        </p:nvSpPr>
+        <p:spPr>
+          <a:xfrm>
+            <a:off x="4180719" y="1532420"/>
+            <a:ext cx="1209281" cy="215444"/>
+          </a:xfrm>
+          <a:prstGeom prst="rect">
+            <a:avLst/>
+          </a:prstGeom>
+          <a:noFill/>
+        </p:spPr>
+        <p:txBody>
+          <a:bodyPr wrap="square" rtlCol="0">
+            <a:spAutoFit/>
+          </a:bodyPr>
+          <a:lstStyle/>
+          <a:p>
+            <a:r>
+              <a:rPr lang="en-US" altLang="zh-TW" sz="800" dirty="0"/>
+              <a:t>Find </a:t>
+            </a:r>
+            <a:r>
+              <a:rPr lang="en-US" altLang="zh-TW" sz="800" dirty="0" err="1"/>
+              <a:t>Bluetooh</a:t>
+            </a:r>
+            <a:r>
+              <a:rPr lang="en-US" altLang="zh-TW" sz="800" dirty="0"/>
+              <a:t> Device</a:t>
+            </a:r>
+            <a:endParaRPr lang="zh-TW" altLang="en-US" sz="800" dirty="0"/>
+          </a:p>
+        </p:txBody>
+      </p:sp>
+      <p:cxnSp>
+        <p:nvCxnSpPr>
+          <p:cNvPr id="38" name="Connector: Curved 37">
+            <a:extLst>
+              <a:ext uri="{FF2B5EF4-FFF2-40B4-BE49-F238E27FC236}">
+                <a16:creationId xmlns:a16="http://schemas.microsoft.com/office/drawing/2014/main" id="{150D1EFA-CC20-4FEC-F979-F25F266E0240}"/>
+              </a:ext>
+            </a:extLst>
+          </p:cNvPr>
+          <p:cNvCxnSpPr>
+            <a:cxnSpLocks/>
+            <a:stCxn id="18" idx="3"/>
+            <a:endCxn id="19" idx="3"/>
+          </p:cNvCxnSpPr>
+          <p:nvPr/>
+        </p:nvCxnSpPr>
+        <p:spPr>
+          <a:xfrm>
+            <a:off x="5061204" y="2559739"/>
+            <a:ext cx="124206" cy="283873"/>
+          </a:xfrm>
+          <a:prstGeom prst="curvedConnector3">
+            <a:avLst>
+              <a:gd name="adj1" fmla="val 284049"/>
+            </a:avLst>
+          </a:prstGeom>
+          <a:ln w="12700">
+            <a:solidFill>
+              <a:srgbClr val="C00000"/>
+            </a:solidFill>
+            <a:tailEnd type="triangle"/>
+          </a:ln>
+        </p:spPr>
+        <p:style>
+          <a:lnRef idx="2">
+            <a:schemeClr val="accent1"/>
+          </a:lnRef>
+          <a:fillRef idx="0">
+            <a:schemeClr val="accent1"/>
+          </a:fillRef>
+          <a:effectRef idx="1">
+            <a:schemeClr val="accent1"/>
+          </a:effectRef>
+          <a:fontRef idx="minor">
+            <a:schemeClr val="tx1"/>
+          </a:fontRef>
+        </p:style>
+      </p:cxnSp>
+      <p:sp>
+        <p:nvSpPr>
+          <p:cNvPr id="44" name="TextBox 43">
+            <a:extLst>
+              <a:ext uri="{FF2B5EF4-FFF2-40B4-BE49-F238E27FC236}">
+                <a16:creationId xmlns:a16="http://schemas.microsoft.com/office/drawing/2014/main" id="{55B312B4-0608-018B-507C-CC4AC45804C0}"/>
+              </a:ext>
+            </a:extLst>
+          </p:cNvPr>
+          <p:cNvSpPr txBox="1"/>
+          <p:nvPr/>
+        </p:nvSpPr>
+        <p:spPr>
+          <a:xfrm>
+            <a:off x="5372855" y="2628169"/>
+            <a:ext cx="1134919" cy="169277"/>
+          </a:xfrm>
+          <a:prstGeom prst="rect">
+            <a:avLst/>
+          </a:prstGeom>
+          <a:noFill/>
+        </p:spPr>
+        <p:txBody>
+          <a:bodyPr wrap="square" rtlCol="0">
+            <a:spAutoFit/>
+          </a:bodyPr>
+          <a:lstStyle/>
+          <a:p>
+            <a:r>
+              <a:rPr lang="en-US" altLang="zh-TW" sz="500" i="1" dirty="0" err="1"/>
+              <a:t>bluetoothSocket.getInputStream</a:t>
+            </a:r>
+            <a:r>
+              <a:rPr lang="en-US" altLang="zh-TW" sz="500" i="1" dirty="0"/>
+              <a:t>()</a:t>
+            </a:r>
+            <a:endParaRPr lang="zh-TW" altLang="en-US" sz="500" i="1" dirty="0"/>
+          </a:p>
+        </p:txBody>
+      </p:sp>
+      <p:cxnSp>
+        <p:nvCxnSpPr>
+          <p:cNvPr id="62" name="Connector: Curved 61">
+            <a:extLst>
+              <a:ext uri="{FF2B5EF4-FFF2-40B4-BE49-F238E27FC236}">
+                <a16:creationId xmlns:a16="http://schemas.microsoft.com/office/drawing/2014/main" id="{2344EB3E-217D-1ADE-19A6-A675644FD0AB}"/>
+              </a:ext>
+            </a:extLst>
+          </p:cNvPr>
+          <p:cNvCxnSpPr>
+            <a:cxnSpLocks/>
+            <a:stCxn id="19" idx="2"/>
+            <a:endCxn id="48" idx="1"/>
+          </p:cNvCxnSpPr>
+          <p:nvPr/>
+        </p:nvCxnSpPr>
+        <p:spPr>
+          <a:xfrm rot="16200000" flipH="1">
+            <a:off x="6161307" y="1648303"/>
+            <a:ext cx="496004" cy="3246374"/>
+          </a:xfrm>
+          <a:prstGeom prst="curvedConnector2">
+            <a:avLst/>
+          </a:prstGeom>
+          <a:ln>
+            <a:tailEnd type="triangle"/>
+          </a:ln>
+        </p:spPr>
+        <p:style>
+          <a:lnRef idx="2">
+            <a:schemeClr val="accent1"/>
+          </a:lnRef>
+          <a:fillRef idx="0">
+            <a:schemeClr val="accent1"/>
+          </a:fillRef>
+          <a:effectRef idx="1">
+            <a:schemeClr val="accent1"/>
+          </a:effectRef>
+          <a:fontRef idx="minor">
+            <a:schemeClr val="tx1"/>
+          </a:fontRef>
+        </p:style>
+      </p:cxnSp>
+      <p:sp>
+        <p:nvSpPr>
+          <p:cNvPr id="1042" name="TextBox 1041">
+            <a:extLst>
+              <a:ext uri="{FF2B5EF4-FFF2-40B4-BE49-F238E27FC236}">
+                <a16:creationId xmlns:a16="http://schemas.microsoft.com/office/drawing/2014/main" id="{5BB7D701-2DD0-1825-945D-D0A7C80DC170}"/>
+              </a:ext>
+            </a:extLst>
+          </p:cNvPr>
+          <p:cNvSpPr txBox="1"/>
+          <p:nvPr/>
+        </p:nvSpPr>
+        <p:spPr>
+          <a:xfrm>
+            <a:off x="5274820" y="3366420"/>
+            <a:ext cx="665494" cy="169277"/>
+          </a:xfrm>
+          <a:prstGeom prst="rect">
+            <a:avLst/>
+          </a:prstGeom>
+          <a:noFill/>
+        </p:spPr>
+        <p:txBody>
+          <a:bodyPr wrap="square" rtlCol="0">
+            <a:spAutoFit/>
+          </a:bodyPr>
+          <a:lstStyle/>
+          <a:p>
+            <a:r>
+              <a:rPr lang="en-US" altLang="zh-TW" sz="500" i="1" dirty="0" err="1"/>
+              <a:t>updateLineChart</a:t>
+            </a:r>
+            <a:r>
+              <a:rPr lang="en-US" altLang="zh-TW" sz="500" i="1" dirty="0"/>
+              <a:t>()</a:t>
+            </a:r>
+            <a:endParaRPr lang="zh-TW" altLang="en-US" sz="500" i="1" dirty="0"/>
+          </a:p>
+        </p:txBody>
+      </p:sp>
+      <p:grpSp>
+        <p:nvGrpSpPr>
+          <p:cNvPr id="1044" name="Group 1043">
+            <a:extLst>
+              <a:ext uri="{FF2B5EF4-FFF2-40B4-BE49-F238E27FC236}">
+                <a16:creationId xmlns:a16="http://schemas.microsoft.com/office/drawing/2014/main" id="{E125582B-6CC8-40A2-63A7-706EA72BAE56}"/>
+              </a:ext>
+            </a:extLst>
+          </p:cNvPr>
+          <p:cNvGrpSpPr/>
+          <p:nvPr/>
+        </p:nvGrpSpPr>
+        <p:grpSpPr>
+          <a:xfrm>
+            <a:off x="8032496" y="2480124"/>
+            <a:ext cx="1444752" cy="2347475"/>
+            <a:chOff x="8032496" y="2480124"/>
+            <a:chExt cx="1444752" cy="2347475"/>
+          </a:xfrm>
+        </p:grpSpPr>
+        <p:grpSp>
+          <p:nvGrpSpPr>
+            <p:cNvPr id="60" name="Group 59">
+              <a:extLst>
+                <a:ext uri="{FF2B5EF4-FFF2-40B4-BE49-F238E27FC236}">
+                  <a16:creationId xmlns:a16="http://schemas.microsoft.com/office/drawing/2014/main" id="{238FAA63-FA5E-56DC-EE0D-D6E2F684A0B1}"/>
+                </a:ext>
+              </a:extLst>
+            </p:cNvPr>
+            <p:cNvGrpSpPr/>
+            <p:nvPr/>
+          </p:nvGrpSpPr>
+          <p:grpSpPr>
+            <a:xfrm>
+              <a:off x="8032496" y="2480124"/>
+              <a:ext cx="1444752" cy="2078736"/>
+              <a:chOff x="7717536" y="1432941"/>
+              <a:chExt cx="1444752" cy="2078736"/>
+            </a:xfrm>
+          </p:grpSpPr>
+          <p:grpSp>
+            <p:nvGrpSpPr>
+              <p:cNvPr id="51" name="Group 50">
+                <a:extLst>
+                  <a:ext uri="{FF2B5EF4-FFF2-40B4-BE49-F238E27FC236}">
+                    <a16:creationId xmlns:a16="http://schemas.microsoft.com/office/drawing/2014/main" id="{24283F57-2F22-575D-372C-B73CDDD66796}"/>
+                  </a:ext>
+                </a:extLst>
+              </p:cNvPr>
+              <p:cNvGrpSpPr/>
+              <p:nvPr/>
+            </p:nvGrpSpPr>
+            <p:grpSpPr>
+              <a:xfrm>
+                <a:off x="7717536" y="1432941"/>
+                <a:ext cx="1444752" cy="2078736"/>
+                <a:chOff x="7717536" y="1438656"/>
+                <a:chExt cx="1444752" cy="2078736"/>
+              </a:xfrm>
+            </p:grpSpPr>
+            <p:sp>
+              <p:nvSpPr>
+                <p:cNvPr id="48" name="Rectangle 47">
+                  <a:extLst>
+                    <a:ext uri="{FF2B5EF4-FFF2-40B4-BE49-F238E27FC236}">
+                      <a16:creationId xmlns:a16="http://schemas.microsoft.com/office/drawing/2014/main" id="{FAAF99CF-4EF8-E7B7-0B7A-302212FF6446}"/>
+                    </a:ext>
+                  </a:extLst>
+                </p:cNvPr>
+                <p:cNvSpPr/>
+                <p:nvPr/>
+              </p:nvSpPr>
+              <p:spPr>
+                <a:xfrm>
+                  <a:off x="7717536" y="1438656"/>
+                  <a:ext cx="1444752" cy="2078736"/>
+                </a:xfrm>
+                <a:prstGeom prst="rect">
+                  <a:avLst/>
+                </a:prstGeom>
+                <a:solidFill>
+                  <a:schemeClr val="tx1"/>
+                </a:solidFill>
+              </p:spPr>
+              <p:style>
+                <a:lnRef idx="2">
+                  <a:schemeClr val="accent1">
+                    <a:shade val="15000"/>
+                  </a:schemeClr>
+                </a:lnRef>
+                <a:fillRef idx="1">
+                  <a:schemeClr val="accent1"/>
+                </a:fillRef>
+                <a:effectRef idx="0">
+                  <a:schemeClr val="accent1"/>
+                </a:effectRef>
+                <a:fontRef idx="minor">
+                  <a:schemeClr val="lt1"/>
+                </a:fontRef>
+              </p:style>
+              <p:txBody>
+                <a:bodyPr rtlCol="0" anchor="ctr"/>
+                <a:lstStyle/>
+                <a:p>
+                  <a:pPr algn="ctr"/>
+                  <a:endParaRPr lang="zh-TW" altLang="en-US"/>
+                </a:p>
+              </p:txBody>
+            </p:sp>
+            <p:sp>
+              <p:nvSpPr>
+                <p:cNvPr id="49" name="Rectangle 48">
+                  <a:extLst>
+                    <a:ext uri="{FF2B5EF4-FFF2-40B4-BE49-F238E27FC236}">
+                      <a16:creationId xmlns:a16="http://schemas.microsoft.com/office/drawing/2014/main" id="{379C7EA1-9A8D-DDB5-19AE-F510E2ED0F76}"/>
+                    </a:ext>
+                  </a:extLst>
+                </p:cNvPr>
+                <p:cNvSpPr/>
+                <p:nvPr/>
+              </p:nvSpPr>
+              <p:spPr>
+                <a:xfrm>
+                  <a:off x="7771801" y="1510566"/>
+                  <a:ext cx="1336222" cy="1860356"/>
+                </a:xfrm>
+                <a:prstGeom prst="rect">
+                  <a:avLst/>
+                </a:prstGeom>
+                <a:solidFill>
+                  <a:schemeClr val="bg2"/>
+                </a:solidFill>
+              </p:spPr>
+              <p:style>
+                <a:lnRef idx="2">
+                  <a:schemeClr val="accent1">
+                    <a:shade val="15000"/>
+                  </a:schemeClr>
+                </a:lnRef>
+                <a:fillRef idx="1">
+                  <a:schemeClr val="accent1"/>
+                </a:fillRef>
+                <a:effectRef idx="0">
+                  <a:schemeClr val="accent1"/>
+                </a:effectRef>
+                <a:fontRef idx="minor">
+                  <a:schemeClr val="lt1"/>
+                </a:fontRef>
+              </p:style>
+              <p:txBody>
+                <a:bodyPr rtlCol="0" anchor="ctr"/>
+                <a:lstStyle/>
+                <a:p>
+                  <a:pPr algn="ctr"/>
+                  <a:endParaRPr lang="zh-TW" altLang="en-US"/>
+                </a:p>
+              </p:txBody>
+            </p:sp>
+            <p:sp>
+              <p:nvSpPr>
+                <p:cNvPr id="50" name="Oval 49">
+                  <a:extLst>
+                    <a:ext uri="{FF2B5EF4-FFF2-40B4-BE49-F238E27FC236}">
+                      <a16:creationId xmlns:a16="http://schemas.microsoft.com/office/drawing/2014/main" id="{374F0181-6886-9346-6CF5-F3F16B4A5C6A}"/>
+                    </a:ext>
+                  </a:extLst>
+                </p:cNvPr>
+                <p:cNvSpPr/>
+                <p:nvPr/>
+              </p:nvSpPr>
+              <p:spPr>
+                <a:xfrm>
+                  <a:off x="8382293" y="3393440"/>
+                  <a:ext cx="115238" cy="115238"/>
+                </a:xfrm>
+                <a:prstGeom prst="ellipse">
+                  <a:avLst/>
+                </a:prstGeom>
+                <a:solidFill>
+                  <a:schemeClr val="tx1">
+                    <a:lumMod val="50000"/>
+                    <a:lumOff val="50000"/>
+                  </a:schemeClr>
+                </a:solidFill>
+                <a:ln>
+                  <a:noFill/>
+                </a:ln>
+              </p:spPr>
+              <p:style>
+                <a:lnRef idx="2">
+                  <a:schemeClr val="accent1">
+                    <a:shade val="15000"/>
+                  </a:schemeClr>
+                </a:lnRef>
+                <a:fillRef idx="1">
+                  <a:schemeClr val="accent1"/>
+                </a:fillRef>
+                <a:effectRef idx="0">
+                  <a:schemeClr val="accent1"/>
+                </a:effectRef>
+                <a:fontRef idx="minor">
+                  <a:schemeClr val="lt1"/>
+                </a:fontRef>
+              </p:style>
+              <p:txBody>
+                <a:bodyPr rtlCol="0" anchor="ctr"/>
+                <a:lstStyle/>
+                <a:p>
+                  <a:pPr algn="ctr"/>
+                  <a:endParaRPr lang="zh-TW" altLang="en-US"/>
+                </a:p>
+              </p:txBody>
+            </p:sp>
+          </p:grpSp>
+          <p:pic>
+            <p:nvPicPr>
+              <p:cNvPr id="55" name="Picture 6" descr="The Coffee Bean Roasting Curve - CoffeeRoast Co.">
+                <a:extLst>
+                  <a:ext uri="{FF2B5EF4-FFF2-40B4-BE49-F238E27FC236}">
+                    <a16:creationId xmlns:a16="http://schemas.microsoft.com/office/drawing/2014/main" id="{999B792C-ECA7-67A1-50E5-64733663DBDB}"/>
+                  </a:ext>
+                </a:extLst>
+              </p:cNvPr>
+              <p:cNvPicPr>
+                <a:picLocks noChangeAspect="1" noChangeArrowheads="1"/>
+              </p:cNvPicPr>
+              <p:nvPr/>
+            </p:nvPicPr>
+            <p:blipFill>
+              <a:blip r:embed="rId6">
+                <a:extLst>
+                  <a:ext uri="{28A0092B-C50C-407E-A947-70E740481C1C}">
+                    <a14:useLocalDpi xmlns:a14="http://schemas.microsoft.com/office/drawing/2010/main" val="0"/>
+                  </a:ext>
+                </a:extLst>
+              </a:blip>
+              <a:srcRect/>
+              <a:stretch>
+                <a:fillRect/>
+              </a:stretch>
+            </p:blipFill>
+            <p:spPr bwMode="auto">
+              <a:xfrm>
+                <a:off x="7942850" y="1668816"/>
+                <a:ext cx="1000938" cy="523407"/>
+              </a:xfrm>
+              <a:prstGeom prst="rect">
+                <a:avLst/>
+              </a:prstGeom>
+              <a:noFill/>
+              <a:extLst>
+                <a:ext uri="{909E8E84-426E-40DD-AFC4-6F175D3DCCD1}">
+                  <a14:hiddenFill xmlns:a14="http://schemas.microsoft.com/office/drawing/2010/main">
+                    <a:solidFill>
+                      <a:srgbClr val="FFFFFF"/>
+                    </a:solidFill>
+                  </a14:hiddenFill>
+                </a:ext>
+              </a:extLst>
+            </p:spPr>
+          </p:pic>
+          <p:sp>
+            <p:nvSpPr>
+              <p:cNvPr id="56" name="TextBox 55">
+                <a:extLst>
+                  <a:ext uri="{FF2B5EF4-FFF2-40B4-BE49-F238E27FC236}">
+                    <a16:creationId xmlns:a16="http://schemas.microsoft.com/office/drawing/2014/main" id="{A99646A3-B6CF-2488-D6A0-CF7B684BA4AD}"/>
+                  </a:ext>
+                </a:extLst>
+              </p:cNvPr>
+              <p:cNvSpPr txBox="1"/>
+              <p:nvPr/>
+            </p:nvSpPr>
+            <p:spPr>
+              <a:xfrm>
+                <a:off x="8304167" y="1567577"/>
+                <a:ext cx="271490" cy="123111"/>
+              </a:xfrm>
+              <a:prstGeom prst="rect">
+                <a:avLst/>
+              </a:prstGeom>
+              <a:noFill/>
+            </p:spPr>
+            <p:txBody>
+              <a:bodyPr wrap="square" rtlCol="0">
+                <a:spAutoFit/>
+              </a:bodyPr>
+              <a:lstStyle/>
+              <a:p>
+                <a:r>
+                  <a:rPr lang="en-US" altLang="zh-TW" sz="200" dirty="0"/>
+                  <a:t>Geisha</a:t>
+                </a:r>
+                <a:endParaRPr lang="zh-TW" altLang="en-US" sz="200" dirty="0"/>
+              </a:p>
+            </p:txBody>
+          </p:sp>
+          <p:sp>
+            <p:nvSpPr>
+              <p:cNvPr id="57" name="Rectangle: Rounded Corners 56">
+                <a:extLst>
+                  <a:ext uri="{FF2B5EF4-FFF2-40B4-BE49-F238E27FC236}">
+                    <a16:creationId xmlns:a16="http://schemas.microsoft.com/office/drawing/2014/main" id="{06A2D64F-C4FD-73A2-7436-3293DE4E0F9A}"/>
+                  </a:ext>
+                </a:extLst>
+              </p:cNvPr>
+              <p:cNvSpPr/>
+              <p:nvPr/>
+            </p:nvSpPr>
+            <p:spPr>
+              <a:xfrm>
+                <a:off x="7942850" y="2329016"/>
+                <a:ext cx="285750" cy="95972"/>
+              </a:xfrm>
+              <a:prstGeom prst="roundRect">
+                <a:avLst/>
+              </a:prstGeom>
+              <a:solidFill>
+                <a:schemeClr val="accent3"/>
+              </a:solidFill>
+              <a:ln>
+                <a:noFill/>
+              </a:ln>
+            </p:spPr>
+            <p:style>
+              <a:lnRef idx="2">
+                <a:schemeClr val="accent1">
+                  <a:shade val="15000"/>
+                </a:schemeClr>
+              </a:lnRef>
+              <a:fillRef idx="1">
+                <a:schemeClr val="accent1"/>
+              </a:fillRef>
+              <a:effectRef idx="0">
+                <a:schemeClr val="accent1"/>
+              </a:effectRef>
+              <a:fontRef idx="minor">
+                <a:schemeClr val="lt1"/>
+              </a:fontRef>
+            </p:style>
+            <p:txBody>
+              <a:bodyPr rtlCol="0" anchor="ctr"/>
+              <a:lstStyle/>
+              <a:p>
+                <a:pPr algn="ctr"/>
+                <a:r>
+                  <a:rPr lang="en-US" altLang="zh-TW" sz="300" dirty="0"/>
+                  <a:t>start</a:t>
+                </a:r>
+                <a:endParaRPr lang="zh-TW" altLang="en-US" sz="300" dirty="0"/>
+              </a:p>
+            </p:txBody>
+          </p:sp>
+          <p:sp>
+            <p:nvSpPr>
+              <p:cNvPr id="58" name="Rectangle: Rounded Corners 57">
+                <a:extLst>
+                  <a:ext uri="{FF2B5EF4-FFF2-40B4-BE49-F238E27FC236}">
+                    <a16:creationId xmlns:a16="http://schemas.microsoft.com/office/drawing/2014/main" id="{E9A2857C-B215-2232-A1FF-B55F283A474D}"/>
+                  </a:ext>
+                </a:extLst>
+              </p:cNvPr>
+              <p:cNvSpPr/>
+              <p:nvPr/>
+            </p:nvSpPr>
+            <p:spPr>
+              <a:xfrm>
+                <a:off x="8658279" y="2329235"/>
+                <a:ext cx="285750" cy="95972"/>
+              </a:xfrm>
+              <a:prstGeom prst="roundRect">
+                <a:avLst/>
+              </a:prstGeom>
+              <a:solidFill>
+                <a:srgbClr val="C00000"/>
+              </a:solidFill>
+              <a:ln>
+                <a:noFill/>
+              </a:ln>
+            </p:spPr>
+            <p:style>
+              <a:lnRef idx="2">
+                <a:schemeClr val="accent1">
+                  <a:shade val="15000"/>
+                </a:schemeClr>
+              </a:lnRef>
+              <a:fillRef idx="1">
+                <a:schemeClr val="accent1"/>
+              </a:fillRef>
+              <a:effectRef idx="0">
+                <a:schemeClr val="accent1"/>
+              </a:effectRef>
+              <a:fontRef idx="minor">
+                <a:schemeClr val="lt1"/>
+              </a:fontRef>
+            </p:style>
+            <p:txBody>
+              <a:bodyPr rtlCol="0" anchor="ctr"/>
+              <a:lstStyle/>
+              <a:p>
+                <a:pPr algn="ctr"/>
+                <a:r>
+                  <a:rPr lang="en-US" altLang="zh-TW" sz="300" dirty="0"/>
+                  <a:t>stop</a:t>
+                </a:r>
+                <a:endParaRPr lang="zh-TW" altLang="en-US" sz="300" dirty="0"/>
+              </a:p>
+            </p:txBody>
+          </p:sp>
+          <p:sp>
+            <p:nvSpPr>
+              <p:cNvPr id="59" name="Rectangle: Rounded Corners 58">
+                <a:extLst>
+                  <a:ext uri="{FF2B5EF4-FFF2-40B4-BE49-F238E27FC236}">
+                    <a16:creationId xmlns:a16="http://schemas.microsoft.com/office/drawing/2014/main" id="{605EDC84-405E-DDDE-D034-F9D2375427C1}"/>
+                  </a:ext>
+                </a:extLst>
+              </p:cNvPr>
+              <p:cNvSpPr/>
+              <p:nvPr/>
+            </p:nvSpPr>
+            <p:spPr>
+              <a:xfrm>
+                <a:off x="8281295" y="2329016"/>
+                <a:ext cx="324289" cy="95972"/>
+              </a:xfrm>
+              <a:prstGeom prst="roundRect">
+                <a:avLst/>
+              </a:prstGeom>
+              <a:ln>
+                <a:noFill/>
+              </a:ln>
+            </p:spPr>
+            <p:style>
+              <a:lnRef idx="2">
+                <a:schemeClr val="accent1">
+                  <a:shade val="15000"/>
+                </a:schemeClr>
+              </a:lnRef>
+              <a:fillRef idx="1">
+                <a:schemeClr val="accent1"/>
+              </a:fillRef>
+              <a:effectRef idx="0">
+                <a:schemeClr val="accent1"/>
+              </a:effectRef>
+              <a:fontRef idx="minor">
+                <a:schemeClr val="lt1"/>
+              </a:fontRef>
+            </p:style>
+            <p:txBody>
+              <a:bodyPr rtlCol="0" anchor="ctr"/>
+              <a:lstStyle/>
+              <a:p>
+                <a:pPr algn="ctr"/>
+                <a:r>
+                  <a:rPr lang="en-US" altLang="zh-TW" sz="300" dirty="0"/>
+                  <a:t>record</a:t>
+                </a:r>
+                <a:endParaRPr lang="zh-TW" altLang="en-US" sz="300" dirty="0"/>
+              </a:p>
+            </p:txBody>
+          </p:sp>
+        </p:grpSp>
+        <p:sp>
+          <p:nvSpPr>
+            <p:cNvPr id="1043" name="TextBox 1042">
+              <a:extLst>
+                <a:ext uri="{FF2B5EF4-FFF2-40B4-BE49-F238E27FC236}">
+                  <a16:creationId xmlns:a16="http://schemas.microsoft.com/office/drawing/2014/main" id="{13000692-0068-81C8-C1D7-862E5E3A7B4C}"/>
+                </a:ext>
+              </a:extLst>
+            </p:cNvPr>
+            <p:cNvSpPr txBox="1"/>
+            <p:nvPr/>
+          </p:nvSpPr>
+          <p:spPr>
+            <a:xfrm>
+              <a:off x="8313682" y="4581378"/>
+              <a:ext cx="882380" cy="246221"/>
+            </a:xfrm>
+            <a:prstGeom prst="rect">
+              <a:avLst/>
+            </a:prstGeom>
+            <a:noFill/>
+          </p:spPr>
+          <p:txBody>
+            <a:bodyPr wrap="square" rtlCol="0">
+              <a:spAutoFit/>
+            </a:bodyPr>
+            <a:lstStyle/>
+            <a:p>
+              <a:r>
+                <a:rPr lang="en-US" altLang="zh-TW" sz="1000" dirty="0" err="1"/>
+                <a:t>mainActivity</a:t>
+              </a:r>
+              <a:endParaRPr lang="zh-TW" altLang="en-US" sz="1000" dirty="0"/>
+            </a:p>
+          </p:txBody>
+        </p:sp>
+      </p:grpSp>
+      <p:grpSp>
+        <p:nvGrpSpPr>
+          <p:cNvPr id="1045" name="Group 1044">
+            <a:extLst>
+              <a:ext uri="{FF2B5EF4-FFF2-40B4-BE49-F238E27FC236}">
+                <a16:creationId xmlns:a16="http://schemas.microsoft.com/office/drawing/2014/main" id="{CBBA3CC1-2131-008E-553A-4D048A209D67}"/>
+              </a:ext>
+            </a:extLst>
+          </p:cNvPr>
+          <p:cNvGrpSpPr/>
+          <p:nvPr/>
+        </p:nvGrpSpPr>
+        <p:grpSpPr>
+          <a:xfrm>
+            <a:off x="10111049" y="935697"/>
+            <a:ext cx="1444752" cy="2341315"/>
+            <a:chOff x="8032496" y="2480124"/>
+            <a:chExt cx="1444752" cy="2341315"/>
+          </a:xfrm>
+        </p:grpSpPr>
+        <p:grpSp>
+          <p:nvGrpSpPr>
+            <p:cNvPr id="1046" name="Group 1045">
+              <a:extLst>
+                <a:ext uri="{FF2B5EF4-FFF2-40B4-BE49-F238E27FC236}">
+                  <a16:creationId xmlns:a16="http://schemas.microsoft.com/office/drawing/2014/main" id="{7EADF120-CD84-5F50-754D-A9EA48BAE376}"/>
+                </a:ext>
+              </a:extLst>
+            </p:cNvPr>
+            <p:cNvGrpSpPr/>
+            <p:nvPr/>
+          </p:nvGrpSpPr>
+          <p:grpSpPr>
+            <a:xfrm>
+              <a:off x="8032496" y="2480124"/>
+              <a:ext cx="1444752" cy="2078736"/>
+              <a:chOff x="7717536" y="1432941"/>
+              <a:chExt cx="1444752" cy="2078736"/>
+            </a:xfrm>
+          </p:grpSpPr>
+          <p:grpSp>
+            <p:nvGrpSpPr>
+              <p:cNvPr id="1048" name="Group 1047">
+                <a:extLst>
+                  <a:ext uri="{FF2B5EF4-FFF2-40B4-BE49-F238E27FC236}">
+                    <a16:creationId xmlns:a16="http://schemas.microsoft.com/office/drawing/2014/main" id="{BDE92ECA-D9AE-667D-6FC0-EE368E4AE709}"/>
+                  </a:ext>
+                </a:extLst>
+              </p:cNvPr>
+              <p:cNvGrpSpPr/>
+              <p:nvPr/>
+            </p:nvGrpSpPr>
+            <p:grpSpPr>
+              <a:xfrm>
+                <a:off x="7717536" y="1432941"/>
+                <a:ext cx="1444752" cy="2078736"/>
+                <a:chOff x="7717536" y="1438656"/>
+                <a:chExt cx="1444752" cy="2078736"/>
+              </a:xfrm>
+            </p:grpSpPr>
+            <p:sp>
+              <p:nvSpPr>
+                <p:cNvPr id="1054" name="Rectangle 1053">
+                  <a:extLst>
+                    <a:ext uri="{FF2B5EF4-FFF2-40B4-BE49-F238E27FC236}">
+                      <a16:creationId xmlns:a16="http://schemas.microsoft.com/office/drawing/2014/main" id="{1F687E5B-4662-C868-88C5-E3A35D363EA2}"/>
+                    </a:ext>
+                  </a:extLst>
+                </p:cNvPr>
+                <p:cNvSpPr/>
+                <p:nvPr/>
+              </p:nvSpPr>
+              <p:spPr>
+                <a:xfrm>
+                  <a:off x="7717536" y="1438656"/>
+                  <a:ext cx="1444752" cy="2078736"/>
+                </a:xfrm>
+                <a:prstGeom prst="rect">
+                  <a:avLst/>
+                </a:prstGeom>
+                <a:solidFill>
+                  <a:schemeClr val="tx1"/>
+                </a:solidFill>
+              </p:spPr>
+              <p:style>
+                <a:lnRef idx="2">
+                  <a:schemeClr val="accent1">
+                    <a:shade val="15000"/>
+                  </a:schemeClr>
+                </a:lnRef>
+                <a:fillRef idx="1">
+                  <a:schemeClr val="accent1"/>
+                </a:fillRef>
+                <a:effectRef idx="0">
+                  <a:schemeClr val="accent1"/>
+                </a:effectRef>
+                <a:fontRef idx="minor">
+                  <a:schemeClr val="lt1"/>
+                </a:fontRef>
+              </p:style>
+              <p:txBody>
+                <a:bodyPr rtlCol="0" anchor="ctr"/>
+                <a:lstStyle/>
+                <a:p>
+                  <a:pPr algn="ctr"/>
+                  <a:endParaRPr lang="zh-TW" altLang="en-US"/>
+                </a:p>
+              </p:txBody>
+            </p:sp>
+            <p:sp>
+              <p:nvSpPr>
+                <p:cNvPr id="1055" name="Rectangle 1054">
+                  <a:extLst>
+                    <a:ext uri="{FF2B5EF4-FFF2-40B4-BE49-F238E27FC236}">
+                      <a16:creationId xmlns:a16="http://schemas.microsoft.com/office/drawing/2014/main" id="{41776CD0-C071-9E3C-876A-F5D9DAC4A36A}"/>
+                    </a:ext>
+                  </a:extLst>
+                </p:cNvPr>
+                <p:cNvSpPr/>
+                <p:nvPr/>
+              </p:nvSpPr>
+              <p:spPr>
+                <a:xfrm>
+                  <a:off x="7771801" y="1510566"/>
+                  <a:ext cx="1336222" cy="1860356"/>
+                </a:xfrm>
+                <a:prstGeom prst="rect">
+                  <a:avLst/>
+                </a:prstGeom>
+                <a:solidFill>
+                  <a:schemeClr val="bg2"/>
+                </a:solidFill>
+              </p:spPr>
+              <p:style>
+                <a:lnRef idx="2">
+                  <a:schemeClr val="accent1">
+                    <a:shade val="15000"/>
+                  </a:schemeClr>
+                </a:lnRef>
+                <a:fillRef idx="1">
+                  <a:schemeClr val="accent1"/>
+                </a:fillRef>
+                <a:effectRef idx="0">
+                  <a:schemeClr val="accent1"/>
+                </a:effectRef>
+                <a:fontRef idx="minor">
+                  <a:schemeClr val="lt1"/>
+                </a:fontRef>
+              </p:style>
+              <p:txBody>
+                <a:bodyPr rtlCol="0" anchor="ctr"/>
+                <a:lstStyle/>
+                <a:p>
+                  <a:pPr algn="ctr"/>
+                  <a:endParaRPr lang="zh-TW" altLang="en-US" dirty="0"/>
+                </a:p>
+              </p:txBody>
+            </p:sp>
+            <p:sp>
+              <p:nvSpPr>
+                <p:cNvPr id="1056" name="Oval 1055">
+                  <a:extLst>
+                    <a:ext uri="{FF2B5EF4-FFF2-40B4-BE49-F238E27FC236}">
+                      <a16:creationId xmlns:a16="http://schemas.microsoft.com/office/drawing/2014/main" id="{3003BAF3-3F69-318F-9553-E32A71E52F6C}"/>
+                    </a:ext>
+                  </a:extLst>
+                </p:cNvPr>
+                <p:cNvSpPr/>
+                <p:nvPr/>
+              </p:nvSpPr>
+              <p:spPr>
+                <a:xfrm>
+                  <a:off x="8382293" y="3393440"/>
+                  <a:ext cx="115238" cy="115238"/>
+                </a:xfrm>
+                <a:prstGeom prst="ellipse">
+                  <a:avLst/>
+                </a:prstGeom>
+                <a:solidFill>
+                  <a:schemeClr val="tx1">
+                    <a:lumMod val="50000"/>
+                    <a:lumOff val="50000"/>
+                  </a:schemeClr>
+                </a:solidFill>
+                <a:ln>
+                  <a:noFill/>
+                </a:ln>
+              </p:spPr>
+              <p:style>
+                <a:lnRef idx="2">
+                  <a:schemeClr val="accent1">
+                    <a:shade val="15000"/>
+                  </a:schemeClr>
+                </a:lnRef>
+                <a:fillRef idx="1">
+                  <a:schemeClr val="accent1"/>
+                </a:fillRef>
+                <a:effectRef idx="0">
+                  <a:schemeClr val="accent1"/>
+                </a:effectRef>
+                <a:fontRef idx="minor">
+                  <a:schemeClr val="lt1"/>
+                </a:fontRef>
+              </p:style>
+              <p:txBody>
+                <a:bodyPr rtlCol="0" anchor="ctr"/>
+                <a:lstStyle/>
+                <a:p>
+                  <a:pPr algn="ctr"/>
+                  <a:endParaRPr lang="zh-TW" altLang="en-US"/>
+                </a:p>
+              </p:txBody>
+            </p:sp>
+          </p:grpSp>
+          <p:sp>
+            <p:nvSpPr>
+              <p:cNvPr id="1050" name="TextBox 1049">
+                <a:extLst>
+                  <a:ext uri="{FF2B5EF4-FFF2-40B4-BE49-F238E27FC236}">
+                    <a16:creationId xmlns:a16="http://schemas.microsoft.com/office/drawing/2014/main" id="{AA1F54E6-9190-FC6F-221B-5E986B065C53}"/>
+                  </a:ext>
+                </a:extLst>
+              </p:cNvPr>
+              <p:cNvSpPr txBox="1"/>
+              <p:nvPr/>
+            </p:nvSpPr>
+            <p:spPr>
+              <a:xfrm>
+                <a:off x="7800454" y="1584722"/>
+                <a:ext cx="407358" cy="153888"/>
+              </a:xfrm>
+              <a:prstGeom prst="rect">
+                <a:avLst/>
+              </a:prstGeom>
+              <a:noFill/>
+            </p:spPr>
+            <p:txBody>
+              <a:bodyPr wrap="square" rtlCol="0">
+                <a:spAutoFit/>
+              </a:bodyPr>
+              <a:lstStyle/>
+              <a:p>
+                <a:r>
+                  <a:rPr lang="en-US" altLang="zh-TW" sz="400" dirty="0" err="1"/>
+                  <a:t>FileName</a:t>
+                </a:r>
+                <a:endParaRPr lang="zh-TW" altLang="en-US" sz="400" dirty="0"/>
+              </a:p>
+            </p:txBody>
+          </p:sp>
+          <p:sp>
+            <p:nvSpPr>
+              <p:cNvPr id="1051" name="Rectangle: Rounded Corners 1050">
+                <a:extLst>
+                  <a:ext uri="{FF2B5EF4-FFF2-40B4-BE49-F238E27FC236}">
+                    <a16:creationId xmlns:a16="http://schemas.microsoft.com/office/drawing/2014/main" id="{6D83EA70-72DF-2B81-5975-A6D65F120C63}"/>
+                  </a:ext>
+                </a:extLst>
+              </p:cNvPr>
+              <p:cNvSpPr/>
+              <p:nvPr/>
+            </p:nvSpPr>
+            <p:spPr>
+              <a:xfrm>
+                <a:off x="8497531" y="2374188"/>
+                <a:ext cx="338445" cy="95972"/>
+              </a:xfrm>
+              <a:prstGeom prst="roundRect">
+                <a:avLst/>
+              </a:prstGeom>
+              <a:solidFill>
+                <a:schemeClr val="accent3"/>
+              </a:solidFill>
+              <a:ln>
+                <a:noFill/>
+              </a:ln>
+            </p:spPr>
+            <p:style>
+              <a:lnRef idx="2">
+                <a:schemeClr val="accent1">
+                  <a:shade val="15000"/>
+                </a:schemeClr>
+              </a:lnRef>
+              <a:fillRef idx="1">
+                <a:schemeClr val="accent1"/>
+              </a:fillRef>
+              <a:effectRef idx="0">
+                <a:schemeClr val="accent1"/>
+              </a:effectRef>
+              <a:fontRef idx="minor">
+                <a:schemeClr val="lt1"/>
+              </a:fontRef>
+            </p:style>
+            <p:txBody>
+              <a:bodyPr rtlCol="0" anchor="ctr"/>
+              <a:lstStyle/>
+              <a:p>
+                <a:pPr algn="ctr"/>
+                <a:r>
+                  <a:rPr lang="en-US" altLang="zh-TW" sz="300" dirty="0"/>
+                  <a:t>Save file</a:t>
+                </a:r>
+                <a:endParaRPr lang="zh-TW" altLang="en-US" sz="300" dirty="0"/>
+              </a:p>
+            </p:txBody>
+          </p:sp>
+        </p:grpSp>
+        <p:sp>
+          <p:nvSpPr>
+            <p:cNvPr id="1047" name="TextBox 1046">
+              <a:extLst>
+                <a:ext uri="{FF2B5EF4-FFF2-40B4-BE49-F238E27FC236}">
+                  <a16:creationId xmlns:a16="http://schemas.microsoft.com/office/drawing/2014/main" id="{BC7BADAC-CE50-EEC7-BC88-61949E455BCC}"/>
+                </a:ext>
+              </a:extLst>
+            </p:cNvPr>
+            <p:cNvSpPr txBox="1"/>
+            <p:nvPr/>
+          </p:nvSpPr>
+          <p:spPr>
+            <a:xfrm>
+              <a:off x="8200221" y="4575218"/>
+              <a:ext cx="1109301" cy="246221"/>
+            </a:xfrm>
+            <a:prstGeom prst="rect">
+              <a:avLst/>
+            </a:prstGeom>
+            <a:noFill/>
+          </p:spPr>
+          <p:txBody>
+            <a:bodyPr wrap="square" rtlCol="0">
+              <a:spAutoFit/>
+            </a:bodyPr>
+            <a:lstStyle/>
+            <a:p>
+              <a:r>
+                <a:rPr lang="en-US" altLang="zh-TW" sz="1000" dirty="0" err="1"/>
+                <a:t>saveFileActivity</a:t>
+              </a:r>
+              <a:endParaRPr lang="zh-TW" altLang="en-US" sz="1000" dirty="0"/>
+            </a:p>
+          </p:txBody>
+        </p:sp>
+      </p:grpSp>
+      <p:grpSp>
+        <p:nvGrpSpPr>
+          <p:cNvPr id="1057" name="Group 1056">
+            <a:extLst>
+              <a:ext uri="{FF2B5EF4-FFF2-40B4-BE49-F238E27FC236}">
+                <a16:creationId xmlns:a16="http://schemas.microsoft.com/office/drawing/2014/main" id="{69AF2916-065C-0371-8992-F86EE5576663}"/>
+              </a:ext>
+            </a:extLst>
+          </p:cNvPr>
+          <p:cNvGrpSpPr/>
+          <p:nvPr/>
+        </p:nvGrpSpPr>
+        <p:grpSpPr>
+          <a:xfrm>
+            <a:off x="5880334" y="4150566"/>
+            <a:ext cx="1819664" cy="2396057"/>
+            <a:chOff x="7845040" y="2480124"/>
+            <a:chExt cx="1819664" cy="2396057"/>
+          </a:xfrm>
+        </p:grpSpPr>
+        <p:grpSp>
+          <p:nvGrpSpPr>
+            <p:cNvPr id="1060" name="Group 1059">
+              <a:extLst>
+                <a:ext uri="{FF2B5EF4-FFF2-40B4-BE49-F238E27FC236}">
+                  <a16:creationId xmlns:a16="http://schemas.microsoft.com/office/drawing/2014/main" id="{998E0B0E-365F-533E-C029-3B585015AFD0}"/>
+                </a:ext>
+              </a:extLst>
+            </p:cNvPr>
+            <p:cNvGrpSpPr/>
+            <p:nvPr/>
+          </p:nvGrpSpPr>
+          <p:grpSpPr>
+            <a:xfrm>
+              <a:off x="8032496" y="2480124"/>
+              <a:ext cx="1444752" cy="2078736"/>
+              <a:chOff x="7717536" y="1438656"/>
+              <a:chExt cx="1444752" cy="2078736"/>
+            </a:xfrm>
+          </p:grpSpPr>
+          <p:sp>
+            <p:nvSpPr>
+              <p:cNvPr id="1066" name="Rectangle 1065">
+                <a:extLst>
+                  <a:ext uri="{FF2B5EF4-FFF2-40B4-BE49-F238E27FC236}">
+                    <a16:creationId xmlns:a16="http://schemas.microsoft.com/office/drawing/2014/main" id="{53881C44-5900-4566-CEF4-E93E07C5749F}"/>
+                  </a:ext>
+                </a:extLst>
+              </p:cNvPr>
+              <p:cNvSpPr/>
+              <p:nvPr/>
+            </p:nvSpPr>
+            <p:spPr>
+              <a:xfrm>
+                <a:off x="7717536" y="1438656"/>
+                <a:ext cx="1444752" cy="2078736"/>
+              </a:xfrm>
+              <a:prstGeom prst="rect">
+                <a:avLst/>
+              </a:prstGeom>
+              <a:solidFill>
+                <a:schemeClr val="tx1"/>
+              </a:solidFill>
+            </p:spPr>
+            <p:style>
+              <a:lnRef idx="2">
+                <a:schemeClr val="accent1">
+                  <a:shade val="15000"/>
+                </a:schemeClr>
+              </a:lnRef>
+              <a:fillRef idx="1">
+                <a:schemeClr val="accent1"/>
+              </a:fillRef>
+              <a:effectRef idx="0">
+                <a:schemeClr val="accent1"/>
+              </a:effectRef>
+              <a:fontRef idx="minor">
+                <a:schemeClr val="lt1"/>
+              </a:fontRef>
+            </p:style>
+            <p:txBody>
+              <a:bodyPr rtlCol="0" anchor="ctr"/>
+              <a:lstStyle/>
+              <a:p>
+                <a:pPr algn="ctr"/>
+                <a:endParaRPr lang="zh-TW" altLang="en-US"/>
+              </a:p>
+            </p:txBody>
+          </p:sp>
+          <p:sp>
+            <p:nvSpPr>
+              <p:cNvPr id="1067" name="Rectangle 1066">
+                <a:extLst>
+                  <a:ext uri="{FF2B5EF4-FFF2-40B4-BE49-F238E27FC236}">
+                    <a16:creationId xmlns:a16="http://schemas.microsoft.com/office/drawing/2014/main" id="{617F0369-4AF8-E149-C696-00EC32077D46}"/>
+                  </a:ext>
+                </a:extLst>
+              </p:cNvPr>
+              <p:cNvSpPr/>
+              <p:nvPr/>
+            </p:nvSpPr>
+            <p:spPr>
+              <a:xfrm>
+                <a:off x="7771801" y="1510566"/>
+                <a:ext cx="1336222" cy="1860356"/>
+              </a:xfrm>
+              <a:prstGeom prst="rect">
+                <a:avLst/>
+              </a:prstGeom>
+              <a:solidFill>
+                <a:schemeClr val="bg2"/>
+              </a:solidFill>
+            </p:spPr>
+            <p:style>
+              <a:lnRef idx="2">
+                <a:schemeClr val="accent1">
+                  <a:shade val="15000"/>
+                </a:schemeClr>
+              </a:lnRef>
+              <a:fillRef idx="1">
+                <a:schemeClr val="accent1"/>
+              </a:fillRef>
+              <a:effectRef idx="0">
+                <a:schemeClr val="accent1"/>
+              </a:effectRef>
+              <a:fontRef idx="minor">
+                <a:schemeClr val="lt1"/>
+              </a:fontRef>
+            </p:style>
+            <p:txBody>
+              <a:bodyPr rtlCol="0" anchor="ctr"/>
+              <a:lstStyle/>
+              <a:p>
+                <a:pPr algn="ctr"/>
+                <a:endParaRPr lang="zh-TW" altLang="en-US"/>
+              </a:p>
+            </p:txBody>
+          </p:sp>
+          <p:sp>
+            <p:nvSpPr>
+              <p:cNvPr id="1068" name="Oval 1067">
+                <a:extLst>
+                  <a:ext uri="{FF2B5EF4-FFF2-40B4-BE49-F238E27FC236}">
+                    <a16:creationId xmlns:a16="http://schemas.microsoft.com/office/drawing/2014/main" id="{462E8E22-10D5-B99E-9F8D-68B494B5AE92}"/>
+                  </a:ext>
+                </a:extLst>
+              </p:cNvPr>
+              <p:cNvSpPr/>
+              <p:nvPr/>
+            </p:nvSpPr>
+            <p:spPr>
+              <a:xfrm>
+                <a:off x="8382293" y="3393440"/>
+                <a:ext cx="115238" cy="115238"/>
+              </a:xfrm>
+              <a:prstGeom prst="ellipse">
+                <a:avLst/>
+              </a:prstGeom>
+              <a:solidFill>
+                <a:schemeClr val="tx1">
+                  <a:lumMod val="50000"/>
+                  <a:lumOff val="50000"/>
+                </a:schemeClr>
+              </a:solidFill>
+              <a:ln>
+                <a:noFill/>
+              </a:ln>
+            </p:spPr>
+            <p:style>
+              <a:lnRef idx="2">
+                <a:schemeClr val="accent1">
+                  <a:shade val="15000"/>
+                </a:schemeClr>
+              </a:lnRef>
+              <a:fillRef idx="1">
+                <a:schemeClr val="accent1"/>
+              </a:fillRef>
+              <a:effectRef idx="0">
+                <a:schemeClr val="accent1"/>
+              </a:effectRef>
+              <a:fontRef idx="minor">
+                <a:schemeClr val="lt1"/>
+              </a:fontRef>
+            </p:style>
+            <p:txBody>
+              <a:bodyPr rtlCol="0" anchor="ctr"/>
+              <a:lstStyle/>
+              <a:p>
+                <a:pPr algn="ctr"/>
+                <a:endParaRPr lang="zh-TW" altLang="en-US"/>
+              </a:p>
+            </p:txBody>
+          </p:sp>
+        </p:grpSp>
+        <p:sp>
+          <p:nvSpPr>
+            <p:cNvPr id="1059" name="TextBox 1058">
+              <a:extLst>
+                <a:ext uri="{FF2B5EF4-FFF2-40B4-BE49-F238E27FC236}">
+                  <a16:creationId xmlns:a16="http://schemas.microsoft.com/office/drawing/2014/main" id="{E062CF76-DFB9-9162-544C-D17A9EC2FD07}"/>
+                </a:ext>
+              </a:extLst>
+            </p:cNvPr>
+            <p:cNvSpPr txBox="1"/>
+            <p:nvPr/>
+          </p:nvSpPr>
+          <p:spPr>
+            <a:xfrm>
+              <a:off x="7845040" y="4629960"/>
+              <a:ext cx="1819664" cy="246221"/>
+            </a:xfrm>
+            <a:prstGeom prst="rect">
+              <a:avLst/>
+            </a:prstGeom>
+            <a:noFill/>
+          </p:spPr>
+          <p:txBody>
+            <a:bodyPr wrap="square" rtlCol="0">
+              <a:spAutoFit/>
+            </a:bodyPr>
+            <a:lstStyle/>
+            <a:p>
+              <a:r>
+                <a:rPr lang="en-US" altLang="zh-TW" sz="1000" dirty="0" err="1"/>
+                <a:t>blutoothOutOffRangeActivity</a:t>
+              </a:r>
+              <a:endParaRPr lang="zh-TW" altLang="en-US" sz="1000" dirty="0"/>
+            </a:p>
+          </p:txBody>
+        </p:sp>
+      </p:grpSp>
+      <p:sp>
+        <p:nvSpPr>
+          <p:cNvPr id="1069" name="Rectangle 1068">
+            <a:extLst>
+              <a:ext uri="{FF2B5EF4-FFF2-40B4-BE49-F238E27FC236}">
+                <a16:creationId xmlns:a16="http://schemas.microsoft.com/office/drawing/2014/main" id="{2AF07CB3-039C-6F08-6C61-F51A1BF6F0D8}"/>
+              </a:ext>
+            </a:extLst>
+          </p:cNvPr>
+          <p:cNvSpPr/>
+          <p:nvPr/>
+        </p:nvSpPr>
+        <p:spPr>
+          <a:xfrm>
+            <a:off x="10282524" y="1224071"/>
+            <a:ext cx="934529" cy="66149"/>
+          </a:xfrm>
+          <a:prstGeom prst="rect">
+            <a:avLst/>
+          </a:prstGeom>
+          <a:solidFill>
+            <a:schemeClr val="bg1"/>
+          </a:solidFill>
+          <a:ln w="6350"/>
+        </p:spPr>
+        <p:style>
+          <a:lnRef idx="2">
+            <a:schemeClr val="accent1">
+              <a:shade val="15000"/>
+            </a:schemeClr>
+          </a:lnRef>
+          <a:fillRef idx="1">
+            <a:schemeClr val="accent1"/>
+          </a:fillRef>
+          <a:effectRef idx="0">
+            <a:schemeClr val="accent1"/>
+          </a:effectRef>
+          <a:fontRef idx="minor">
+            <a:schemeClr val="lt1"/>
+          </a:fontRef>
+        </p:style>
+        <p:txBody>
+          <a:bodyPr rtlCol="0" anchor="ctr"/>
+          <a:lstStyle/>
+          <a:p>
+            <a:pPr algn="ctr"/>
+            <a:endParaRPr lang="zh-TW" altLang="en-US"/>
+          </a:p>
+        </p:txBody>
+      </p:sp>
+      <p:sp>
+        <p:nvSpPr>
+          <p:cNvPr id="1082" name="Rectangle 1081">
+            <a:extLst>
+              <a:ext uri="{FF2B5EF4-FFF2-40B4-BE49-F238E27FC236}">
+                <a16:creationId xmlns:a16="http://schemas.microsoft.com/office/drawing/2014/main" id="{C1D09292-AED6-69FA-8AB1-F372549D09A3}"/>
+              </a:ext>
+            </a:extLst>
+          </p:cNvPr>
+          <p:cNvSpPr/>
+          <p:nvPr/>
+        </p:nvSpPr>
+        <p:spPr>
+          <a:xfrm>
+            <a:off x="10282523" y="1643103"/>
+            <a:ext cx="934529" cy="145059"/>
+          </a:xfrm>
+          <a:prstGeom prst="rect">
+            <a:avLst/>
+          </a:prstGeom>
+          <a:solidFill>
+            <a:schemeClr val="bg1"/>
+          </a:solidFill>
+          <a:ln w="6350"/>
+        </p:spPr>
+        <p:style>
+          <a:lnRef idx="2">
+            <a:schemeClr val="accent1">
+              <a:shade val="15000"/>
+            </a:schemeClr>
+          </a:lnRef>
+          <a:fillRef idx="1">
+            <a:schemeClr val="accent1"/>
+          </a:fillRef>
+          <a:effectRef idx="0">
+            <a:schemeClr val="accent1"/>
+          </a:effectRef>
+          <a:fontRef idx="minor">
+            <a:schemeClr val="lt1"/>
+          </a:fontRef>
+        </p:style>
+        <p:txBody>
+          <a:bodyPr rtlCol="0" anchor="ctr"/>
+          <a:lstStyle/>
+          <a:p>
+            <a:pPr algn="ctr"/>
+            <a:endParaRPr lang="zh-TW" altLang="en-US" dirty="0"/>
+          </a:p>
+        </p:txBody>
+      </p:sp>
+      <p:sp>
+        <p:nvSpPr>
+          <p:cNvPr id="1083" name="Rectangle 1082">
+            <a:extLst>
+              <a:ext uri="{FF2B5EF4-FFF2-40B4-BE49-F238E27FC236}">
+                <a16:creationId xmlns:a16="http://schemas.microsoft.com/office/drawing/2014/main" id="{5D06CE78-6D17-0A2D-7052-D92C1CAD37C3}"/>
+              </a:ext>
+            </a:extLst>
+          </p:cNvPr>
+          <p:cNvSpPr/>
+          <p:nvPr/>
+        </p:nvSpPr>
+        <p:spPr>
+          <a:xfrm>
+            <a:off x="10278774" y="1432952"/>
+            <a:ext cx="934529" cy="66149"/>
+          </a:xfrm>
+          <a:prstGeom prst="rect">
+            <a:avLst/>
+          </a:prstGeom>
+          <a:solidFill>
+            <a:schemeClr val="bg1"/>
+          </a:solidFill>
+          <a:ln w="6350"/>
+        </p:spPr>
+        <p:style>
+          <a:lnRef idx="2">
+            <a:schemeClr val="accent1">
+              <a:shade val="15000"/>
+            </a:schemeClr>
+          </a:lnRef>
+          <a:fillRef idx="1">
+            <a:schemeClr val="accent1"/>
+          </a:fillRef>
+          <a:effectRef idx="0">
+            <a:schemeClr val="accent1"/>
+          </a:effectRef>
+          <a:fontRef idx="minor">
+            <a:schemeClr val="lt1"/>
+          </a:fontRef>
+        </p:style>
+        <p:txBody>
+          <a:bodyPr rtlCol="0" anchor="ctr"/>
+          <a:lstStyle/>
+          <a:p>
+            <a:pPr algn="ctr"/>
+            <a:endParaRPr lang="zh-TW" altLang="en-US"/>
+          </a:p>
+        </p:txBody>
+      </p:sp>
+      <p:sp>
+        <p:nvSpPr>
+          <p:cNvPr id="1084" name="TextBox 1083">
+            <a:extLst>
+              <a:ext uri="{FF2B5EF4-FFF2-40B4-BE49-F238E27FC236}">
+                <a16:creationId xmlns:a16="http://schemas.microsoft.com/office/drawing/2014/main" id="{1FE54C28-3E0A-19EC-4175-041CE6CF562B}"/>
+              </a:ext>
+            </a:extLst>
+          </p:cNvPr>
+          <p:cNvSpPr txBox="1"/>
+          <p:nvPr/>
+        </p:nvSpPr>
+        <p:spPr>
+          <a:xfrm>
+            <a:off x="10193135" y="1498524"/>
+            <a:ext cx="462843" cy="153888"/>
+          </a:xfrm>
+          <a:prstGeom prst="rect">
+            <a:avLst/>
+          </a:prstGeom>
+          <a:noFill/>
+        </p:spPr>
+        <p:txBody>
+          <a:bodyPr wrap="square" rtlCol="0">
+            <a:spAutoFit/>
+          </a:bodyPr>
+          <a:lstStyle/>
+          <a:p>
+            <a:r>
+              <a:rPr lang="en-US" altLang="zh-TW" sz="400" dirty="0"/>
+              <a:t>Description</a:t>
+            </a:r>
+            <a:endParaRPr lang="zh-TW" altLang="en-US" sz="400" dirty="0"/>
+          </a:p>
+        </p:txBody>
+      </p:sp>
+      <p:grpSp>
+        <p:nvGrpSpPr>
+          <p:cNvPr id="1085" name="Group 1084">
+            <a:extLst>
+              <a:ext uri="{FF2B5EF4-FFF2-40B4-BE49-F238E27FC236}">
+                <a16:creationId xmlns:a16="http://schemas.microsoft.com/office/drawing/2014/main" id="{218D6B1B-9037-6A4C-F2E3-CCCA43BFCE41}"/>
+              </a:ext>
+            </a:extLst>
+          </p:cNvPr>
+          <p:cNvGrpSpPr/>
+          <p:nvPr/>
+        </p:nvGrpSpPr>
+        <p:grpSpPr>
+          <a:xfrm>
+            <a:off x="9951414" y="4148392"/>
+            <a:ext cx="1819664" cy="2396057"/>
+            <a:chOff x="7845040" y="2480124"/>
+            <a:chExt cx="1819664" cy="2396057"/>
+          </a:xfrm>
+        </p:grpSpPr>
+        <p:grpSp>
+          <p:nvGrpSpPr>
+            <p:cNvPr id="1086" name="Group 1085">
+              <a:extLst>
+                <a:ext uri="{FF2B5EF4-FFF2-40B4-BE49-F238E27FC236}">
+                  <a16:creationId xmlns:a16="http://schemas.microsoft.com/office/drawing/2014/main" id="{D50BF484-AFA2-CA4F-2D65-3127FB60D64E}"/>
+                </a:ext>
+              </a:extLst>
+            </p:cNvPr>
+            <p:cNvGrpSpPr/>
+            <p:nvPr/>
+          </p:nvGrpSpPr>
+          <p:grpSpPr>
+            <a:xfrm>
+              <a:off x="8032496" y="2480124"/>
+              <a:ext cx="1444752" cy="2078736"/>
+              <a:chOff x="7717536" y="1432941"/>
+              <a:chExt cx="1444752" cy="2078736"/>
+            </a:xfrm>
+          </p:grpSpPr>
+          <p:grpSp>
+            <p:nvGrpSpPr>
+              <p:cNvPr id="1088" name="Group 1087">
+                <a:extLst>
+                  <a:ext uri="{FF2B5EF4-FFF2-40B4-BE49-F238E27FC236}">
+                    <a16:creationId xmlns:a16="http://schemas.microsoft.com/office/drawing/2014/main" id="{EB746C47-73C5-60D6-BBEA-75ACA3A87501}"/>
+                  </a:ext>
+                </a:extLst>
+              </p:cNvPr>
+              <p:cNvGrpSpPr/>
+              <p:nvPr/>
+            </p:nvGrpSpPr>
+            <p:grpSpPr>
+              <a:xfrm>
+                <a:off x="7717536" y="1432941"/>
+                <a:ext cx="1444752" cy="2078736"/>
+                <a:chOff x="7717536" y="1438656"/>
+                <a:chExt cx="1444752" cy="2078736"/>
+              </a:xfrm>
+            </p:grpSpPr>
+            <p:sp>
+              <p:nvSpPr>
+                <p:cNvPr id="1094" name="Rectangle 1093">
+                  <a:extLst>
+                    <a:ext uri="{FF2B5EF4-FFF2-40B4-BE49-F238E27FC236}">
+                      <a16:creationId xmlns:a16="http://schemas.microsoft.com/office/drawing/2014/main" id="{3B4898D1-B150-4F6E-C119-AD98F60EE4A1}"/>
+                    </a:ext>
+                  </a:extLst>
+                </p:cNvPr>
+                <p:cNvSpPr/>
+                <p:nvPr/>
+              </p:nvSpPr>
+              <p:spPr>
+                <a:xfrm>
+                  <a:off x="7717536" y="1438656"/>
+                  <a:ext cx="1444752" cy="2078736"/>
+                </a:xfrm>
+                <a:prstGeom prst="rect">
+                  <a:avLst/>
+                </a:prstGeom>
+                <a:solidFill>
+                  <a:schemeClr val="tx1"/>
+                </a:solidFill>
+              </p:spPr>
+              <p:style>
+                <a:lnRef idx="2">
+                  <a:schemeClr val="accent1">
+                    <a:shade val="15000"/>
+                  </a:schemeClr>
+                </a:lnRef>
+                <a:fillRef idx="1">
+                  <a:schemeClr val="accent1"/>
+                </a:fillRef>
+                <a:effectRef idx="0">
+                  <a:schemeClr val="accent1"/>
+                </a:effectRef>
+                <a:fontRef idx="minor">
+                  <a:schemeClr val="lt1"/>
+                </a:fontRef>
+              </p:style>
+              <p:txBody>
+                <a:bodyPr rtlCol="0" anchor="ctr"/>
+                <a:lstStyle/>
+                <a:p>
+                  <a:pPr algn="ctr"/>
+                  <a:endParaRPr lang="zh-TW" altLang="en-US"/>
+                </a:p>
+              </p:txBody>
+            </p:sp>
+            <p:sp>
+              <p:nvSpPr>
+                <p:cNvPr id="1095" name="Rectangle 1094">
+                  <a:extLst>
+                    <a:ext uri="{FF2B5EF4-FFF2-40B4-BE49-F238E27FC236}">
+                      <a16:creationId xmlns:a16="http://schemas.microsoft.com/office/drawing/2014/main" id="{473963AF-9A54-5819-8DB9-7452AE6C846B}"/>
+                    </a:ext>
+                  </a:extLst>
+                </p:cNvPr>
+                <p:cNvSpPr/>
+                <p:nvPr/>
+              </p:nvSpPr>
+              <p:spPr>
+                <a:xfrm>
+                  <a:off x="7771801" y="1510566"/>
+                  <a:ext cx="1336222" cy="1860356"/>
+                </a:xfrm>
+                <a:prstGeom prst="rect">
+                  <a:avLst/>
+                </a:prstGeom>
+                <a:solidFill>
+                  <a:schemeClr val="bg2"/>
+                </a:solidFill>
+              </p:spPr>
+              <p:style>
+                <a:lnRef idx="2">
+                  <a:schemeClr val="accent1">
+                    <a:shade val="15000"/>
+                  </a:schemeClr>
+                </a:lnRef>
+                <a:fillRef idx="1">
+                  <a:schemeClr val="accent1"/>
+                </a:fillRef>
+                <a:effectRef idx="0">
+                  <a:schemeClr val="accent1"/>
+                </a:effectRef>
+                <a:fontRef idx="minor">
+                  <a:schemeClr val="lt1"/>
+                </a:fontRef>
+              </p:style>
+              <p:txBody>
+                <a:bodyPr rtlCol="0" anchor="ctr"/>
+                <a:lstStyle/>
+                <a:p>
+                  <a:pPr algn="ctr"/>
+                  <a:endParaRPr lang="zh-TW" altLang="en-US"/>
+                </a:p>
+              </p:txBody>
+            </p:sp>
+            <p:sp>
+              <p:nvSpPr>
+                <p:cNvPr id="1096" name="Oval 1095">
+                  <a:extLst>
+                    <a:ext uri="{FF2B5EF4-FFF2-40B4-BE49-F238E27FC236}">
+                      <a16:creationId xmlns:a16="http://schemas.microsoft.com/office/drawing/2014/main" id="{5F7FC06F-824E-1A8F-F7C9-5A8F1F53A6C7}"/>
+                    </a:ext>
+                  </a:extLst>
+                </p:cNvPr>
+                <p:cNvSpPr/>
+                <p:nvPr/>
+              </p:nvSpPr>
+              <p:spPr>
+                <a:xfrm>
+                  <a:off x="8382293" y="3393440"/>
+                  <a:ext cx="115238" cy="115238"/>
+                </a:xfrm>
+                <a:prstGeom prst="ellipse">
+                  <a:avLst/>
+                </a:prstGeom>
+                <a:solidFill>
+                  <a:schemeClr val="tx1">
+                    <a:lumMod val="50000"/>
+                    <a:lumOff val="50000"/>
+                  </a:schemeClr>
+                </a:solidFill>
+                <a:ln>
+                  <a:noFill/>
+                </a:ln>
+              </p:spPr>
+              <p:style>
+                <a:lnRef idx="2">
+                  <a:schemeClr val="accent1">
+                    <a:shade val="15000"/>
+                  </a:schemeClr>
+                </a:lnRef>
+                <a:fillRef idx="1">
+                  <a:schemeClr val="accent1"/>
+                </a:fillRef>
+                <a:effectRef idx="0">
+                  <a:schemeClr val="accent1"/>
+                </a:effectRef>
+                <a:fontRef idx="minor">
+                  <a:schemeClr val="lt1"/>
+                </a:fontRef>
+              </p:style>
+              <p:txBody>
+                <a:bodyPr rtlCol="0" anchor="ctr"/>
+                <a:lstStyle/>
+                <a:p>
+                  <a:pPr algn="ctr"/>
+                  <a:endParaRPr lang="zh-TW" altLang="en-US"/>
+                </a:p>
+              </p:txBody>
+            </p:sp>
+          </p:grpSp>
+          <p:pic>
+            <p:nvPicPr>
+              <p:cNvPr id="1089" name="Picture 6" descr="The Coffee Bean Roasting Curve - CoffeeRoast Co.">
+                <a:extLst>
+                  <a:ext uri="{FF2B5EF4-FFF2-40B4-BE49-F238E27FC236}">
+                    <a16:creationId xmlns:a16="http://schemas.microsoft.com/office/drawing/2014/main" id="{54074344-B1F5-554A-1688-01A2089D55BF}"/>
+                  </a:ext>
+                </a:extLst>
+              </p:cNvPr>
+              <p:cNvPicPr>
+                <a:picLocks noChangeAspect="1" noChangeArrowheads="1"/>
+              </p:cNvPicPr>
+              <p:nvPr/>
+            </p:nvPicPr>
+            <p:blipFill>
+              <a:blip r:embed="rId6">
+                <a:extLst>
+                  <a:ext uri="{28A0092B-C50C-407E-A947-70E740481C1C}">
+                    <a14:useLocalDpi xmlns:a14="http://schemas.microsoft.com/office/drawing/2010/main" val="0"/>
+                  </a:ext>
+                </a:extLst>
+              </a:blip>
+              <a:srcRect/>
+              <a:stretch>
+                <a:fillRect/>
+              </a:stretch>
+            </p:blipFill>
+            <p:spPr bwMode="auto">
+              <a:xfrm>
+                <a:off x="7939442" y="1851023"/>
+                <a:ext cx="1000938" cy="523407"/>
+              </a:xfrm>
+              <a:prstGeom prst="rect">
+                <a:avLst/>
+              </a:prstGeom>
+              <a:noFill/>
+              <a:extLst>
+                <a:ext uri="{909E8E84-426E-40DD-AFC4-6F175D3DCCD1}">
+                  <a14:hiddenFill xmlns:a14="http://schemas.microsoft.com/office/drawing/2010/main">
+                    <a:solidFill>
+                      <a:srgbClr val="FFFFFF"/>
+                    </a:solidFill>
+                  </a14:hiddenFill>
+                </a:ext>
+              </a:extLst>
+            </p:spPr>
+          </p:pic>
+          <p:sp>
+            <p:nvSpPr>
+              <p:cNvPr id="1090" name="TextBox 1089">
+                <a:extLst>
+                  <a:ext uri="{FF2B5EF4-FFF2-40B4-BE49-F238E27FC236}">
+                    <a16:creationId xmlns:a16="http://schemas.microsoft.com/office/drawing/2014/main" id="{072A114C-D430-7F33-870E-C4D166FFDD37}"/>
+                  </a:ext>
+                </a:extLst>
+              </p:cNvPr>
+              <p:cNvSpPr txBox="1"/>
+              <p:nvPr/>
+            </p:nvSpPr>
+            <p:spPr>
+              <a:xfrm>
+                <a:off x="8170212" y="1616843"/>
+                <a:ext cx="539399" cy="215444"/>
+              </a:xfrm>
+              <a:prstGeom prst="rect">
+                <a:avLst/>
+              </a:prstGeom>
+              <a:noFill/>
+            </p:spPr>
+            <p:txBody>
+              <a:bodyPr wrap="square" rtlCol="0">
+                <a:spAutoFit/>
+              </a:bodyPr>
+              <a:lstStyle/>
+              <a:p>
+                <a:r>
+                  <a:rPr lang="en-US" altLang="zh-TW" sz="800" dirty="0"/>
+                  <a:t>Geisha</a:t>
+                </a:r>
+                <a:endParaRPr lang="zh-TW" altLang="en-US" sz="800" dirty="0"/>
+              </a:p>
+            </p:txBody>
+          </p:sp>
+        </p:grpSp>
+        <p:sp>
+          <p:nvSpPr>
+            <p:cNvPr id="1087" name="TextBox 1086">
+              <a:extLst>
+                <a:ext uri="{FF2B5EF4-FFF2-40B4-BE49-F238E27FC236}">
+                  <a16:creationId xmlns:a16="http://schemas.microsoft.com/office/drawing/2014/main" id="{4BE62655-5695-331A-9E38-1A86E97C0360}"/>
+                </a:ext>
+              </a:extLst>
+            </p:cNvPr>
+            <p:cNvSpPr txBox="1"/>
+            <p:nvPr/>
+          </p:nvSpPr>
+          <p:spPr>
+            <a:xfrm>
+              <a:off x="7845040" y="4629960"/>
+              <a:ext cx="1819664" cy="246221"/>
+            </a:xfrm>
+            <a:prstGeom prst="rect">
+              <a:avLst/>
+            </a:prstGeom>
+            <a:noFill/>
+          </p:spPr>
+          <p:txBody>
+            <a:bodyPr wrap="square" rtlCol="0">
+              <a:spAutoFit/>
+            </a:bodyPr>
+            <a:lstStyle/>
+            <a:p>
+              <a:r>
+                <a:rPr lang="en-US" altLang="zh-TW" sz="1000" dirty="0" err="1"/>
+                <a:t>browseHistoryDataActivity</a:t>
+              </a:r>
+              <a:endParaRPr lang="zh-TW" altLang="en-US" sz="1000" dirty="0"/>
+            </a:p>
+          </p:txBody>
+        </p:sp>
+      </p:grpSp>
+      <p:sp>
+        <p:nvSpPr>
+          <p:cNvPr id="1097" name="Arrow: Bent 1096">
+            <a:extLst>
+              <a:ext uri="{FF2B5EF4-FFF2-40B4-BE49-F238E27FC236}">
+                <a16:creationId xmlns:a16="http://schemas.microsoft.com/office/drawing/2014/main" id="{26DE7806-0B52-0C22-E70D-09BF77EAC341}"/>
+              </a:ext>
+            </a:extLst>
+          </p:cNvPr>
+          <p:cNvSpPr/>
+          <p:nvPr/>
+        </p:nvSpPr>
+        <p:spPr>
+          <a:xfrm rot="10800000" flipV="1">
+            <a:off x="10263618" y="4285202"/>
+            <a:ext cx="83490" cy="76343"/>
+          </a:xfrm>
+          <a:prstGeom prst="bentArrow">
+            <a:avLst/>
+          </a:prstGeom>
+          <a:solidFill>
+            <a:schemeClr val="tx1"/>
+          </a:solidFill>
+        </p:spPr>
+        <p:style>
+          <a:lnRef idx="2">
+            <a:schemeClr val="accent1">
+              <a:shade val="15000"/>
+            </a:schemeClr>
+          </a:lnRef>
+          <a:fillRef idx="1">
+            <a:schemeClr val="accent1"/>
+          </a:fillRef>
+          <a:effectRef idx="0">
+            <a:schemeClr val="accent1"/>
+          </a:effectRef>
+          <a:fontRef idx="minor">
+            <a:schemeClr val="lt1"/>
+          </a:fontRef>
+        </p:style>
+        <p:txBody>
+          <a:bodyPr rtlCol="0" anchor="ctr"/>
+          <a:lstStyle/>
+          <a:p>
+            <a:pPr algn="ctr"/>
+            <a:endParaRPr lang="zh-TW" altLang="en-US">
+              <a:solidFill>
+                <a:schemeClr val="tx1"/>
+              </a:solidFill>
+            </a:endParaRPr>
+          </a:p>
+        </p:txBody>
+      </p:sp>
+      <p:sp>
+        <p:nvSpPr>
+          <p:cNvPr id="1099" name="Rectangle 1098">
+            <a:extLst>
+              <a:ext uri="{FF2B5EF4-FFF2-40B4-BE49-F238E27FC236}">
+                <a16:creationId xmlns:a16="http://schemas.microsoft.com/office/drawing/2014/main" id="{D835B54D-85BF-FBAD-D6EF-6771946EBD21}"/>
+              </a:ext>
+            </a:extLst>
+          </p:cNvPr>
+          <p:cNvSpPr/>
+          <p:nvPr/>
+        </p:nvSpPr>
+        <p:spPr>
+          <a:xfrm>
+            <a:off x="10366159" y="5333769"/>
+            <a:ext cx="934529" cy="272341"/>
+          </a:xfrm>
+          <a:prstGeom prst="rect">
+            <a:avLst/>
+          </a:prstGeom>
+          <a:solidFill>
+            <a:schemeClr val="bg1"/>
+          </a:solidFill>
+          <a:ln w="6350"/>
+        </p:spPr>
+        <p:style>
+          <a:lnRef idx="2">
+            <a:schemeClr val="accent1">
+              <a:shade val="15000"/>
+            </a:schemeClr>
+          </a:lnRef>
+          <a:fillRef idx="1">
+            <a:schemeClr val="accent1"/>
+          </a:fillRef>
+          <a:effectRef idx="0">
+            <a:schemeClr val="accent1"/>
+          </a:effectRef>
+          <a:fontRef idx="minor">
+            <a:schemeClr val="lt1"/>
+          </a:fontRef>
+        </p:style>
+        <p:txBody>
+          <a:bodyPr rtlCol="0" anchor="ctr"/>
+          <a:lstStyle/>
+          <a:p>
+            <a:pPr algn="ctr"/>
+            <a:endParaRPr lang="zh-TW" altLang="en-US" dirty="0"/>
+          </a:p>
+        </p:txBody>
+      </p:sp>
+      <p:sp>
+        <p:nvSpPr>
+          <p:cNvPr id="1101" name="TextBox 1100">
+            <a:extLst>
+              <a:ext uri="{FF2B5EF4-FFF2-40B4-BE49-F238E27FC236}">
+                <a16:creationId xmlns:a16="http://schemas.microsoft.com/office/drawing/2014/main" id="{670451AB-63CD-43BF-AF50-93415FA3DB56}"/>
+              </a:ext>
+            </a:extLst>
+          </p:cNvPr>
+          <p:cNvSpPr txBox="1"/>
+          <p:nvPr/>
+        </p:nvSpPr>
+        <p:spPr>
+          <a:xfrm>
+            <a:off x="10278774" y="5181311"/>
+            <a:ext cx="462843" cy="153888"/>
+          </a:xfrm>
+          <a:prstGeom prst="rect">
+            <a:avLst/>
+          </a:prstGeom>
+          <a:noFill/>
+        </p:spPr>
+        <p:txBody>
+          <a:bodyPr wrap="square" rtlCol="0">
+            <a:spAutoFit/>
+          </a:bodyPr>
+          <a:lstStyle/>
+          <a:p>
+            <a:r>
+              <a:rPr lang="en-US" altLang="zh-TW" sz="400" dirty="0"/>
+              <a:t>Description</a:t>
+            </a:r>
+            <a:endParaRPr lang="zh-TW" altLang="en-US" sz="400" dirty="0"/>
+          </a:p>
+        </p:txBody>
+      </p:sp>
+      <p:pic>
+        <p:nvPicPr>
+          <p:cNvPr id="1102" name="Picture 8" descr="Warning Vector Art, Icons, and Graphics for Free Download">
+            <a:extLst>
+              <a:ext uri="{FF2B5EF4-FFF2-40B4-BE49-F238E27FC236}">
+                <a16:creationId xmlns:a16="http://schemas.microsoft.com/office/drawing/2014/main" id="{261209BE-2538-575D-F5BB-B8D06CFE3471}"/>
+              </a:ext>
+            </a:extLst>
+          </p:cNvPr>
+          <p:cNvPicPr>
+            <a:picLocks noChangeAspect="1" noChangeArrowheads="1"/>
+          </p:cNvPicPr>
+          <p:nvPr/>
+        </p:nvPicPr>
+        <p:blipFill>
+          <a:blip r:embed="rId7">
+            <a:extLst>
+              <a:ext uri="{28A0092B-C50C-407E-A947-70E740481C1C}">
+                <a14:useLocalDpi xmlns:a14="http://schemas.microsoft.com/office/drawing/2010/main" val="0"/>
+              </a:ext>
+            </a:extLst>
+          </a:blip>
+          <a:srcRect/>
+          <a:stretch>
+            <a:fillRect/>
+          </a:stretch>
+        </p:blipFill>
+        <p:spPr bwMode="auto">
+          <a:xfrm>
+            <a:off x="6457419" y="4668275"/>
+            <a:ext cx="665494" cy="665494"/>
+          </a:xfrm>
+          <a:prstGeom prst="rect">
+            <a:avLst/>
+          </a:prstGeom>
+          <a:noFill/>
+          <a:extLst>
+            <a:ext uri="{909E8E84-426E-40DD-AFC4-6F175D3DCCD1}">
+              <a14:hiddenFill xmlns:a14="http://schemas.microsoft.com/office/drawing/2010/main">
+                <a:solidFill>
+                  <a:srgbClr val="FFFFFF"/>
+                </a:solidFill>
+              </a14:hiddenFill>
+            </a:ext>
+          </a:extLst>
+        </p:spPr>
+      </p:pic>
+      <p:sp>
+        <p:nvSpPr>
+          <p:cNvPr id="1103" name="TextBox 1102">
+            <a:extLst>
+              <a:ext uri="{FF2B5EF4-FFF2-40B4-BE49-F238E27FC236}">
+                <a16:creationId xmlns:a16="http://schemas.microsoft.com/office/drawing/2014/main" id="{6345283A-3C89-C26C-F186-9A2609CFF03A}"/>
+              </a:ext>
+            </a:extLst>
+          </p:cNvPr>
+          <p:cNvSpPr txBox="1"/>
+          <p:nvPr/>
+        </p:nvSpPr>
+        <p:spPr>
+          <a:xfrm>
+            <a:off x="6302240" y="5469939"/>
+            <a:ext cx="980186" cy="338554"/>
+          </a:xfrm>
+          <a:prstGeom prst="rect">
+            <a:avLst/>
+          </a:prstGeom>
+          <a:noFill/>
+        </p:spPr>
+        <p:txBody>
+          <a:bodyPr wrap="square" rtlCol="0">
+            <a:spAutoFit/>
+          </a:bodyPr>
+          <a:lstStyle/>
+          <a:p>
+            <a:pPr algn="ctr"/>
+            <a:r>
+              <a:rPr lang="en-US" altLang="zh-TW" sz="800" dirty="0"/>
+              <a:t>Please get back to device !</a:t>
+            </a:r>
+            <a:endParaRPr lang="zh-TW" altLang="en-US" sz="800" dirty="0"/>
+          </a:p>
+        </p:txBody>
+      </p:sp>
+      <p:cxnSp>
+        <p:nvCxnSpPr>
+          <p:cNvPr id="1105" name="Connector: Curved 1104">
+            <a:extLst>
+              <a:ext uri="{FF2B5EF4-FFF2-40B4-BE49-F238E27FC236}">
+                <a16:creationId xmlns:a16="http://schemas.microsoft.com/office/drawing/2014/main" id="{DEAFFFDB-91FF-19B9-B2B6-247F51CC9E6F}"/>
+              </a:ext>
+            </a:extLst>
+          </p:cNvPr>
+          <p:cNvCxnSpPr>
+            <a:cxnSpLocks/>
+            <a:stCxn id="48" idx="3"/>
+            <a:endCxn id="1054" idx="1"/>
+          </p:cNvCxnSpPr>
+          <p:nvPr/>
+        </p:nvCxnSpPr>
+        <p:spPr>
+          <a:xfrm flipV="1">
+            <a:off x="9477248" y="1975065"/>
+            <a:ext cx="633801" cy="1544427"/>
+          </a:xfrm>
+          <a:prstGeom prst="curvedConnector3">
+            <a:avLst>
+              <a:gd name="adj1" fmla="val 50000"/>
+            </a:avLst>
+          </a:prstGeom>
+          <a:ln>
+            <a:tailEnd type="triangle"/>
+          </a:ln>
+        </p:spPr>
+        <p:style>
+          <a:lnRef idx="2">
+            <a:schemeClr val="accent1"/>
+          </a:lnRef>
+          <a:fillRef idx="0">
+            <a:schemeClr val="accent1"/>
+          </a:fillRef>
+          <a:effectRef idx="1">
+            <a:schemeClr val="accent1"/>
+          </a:effectRef>
+          <a:fontRef idx="minor">
+            <a:schemeClr val="tx1"/>
+          </a:fontRef>
+        </p:style>
+      </p:cxnSp>
+      <p:sp>
+        <p:nvSpPr>
+          <p:cNvPr id="1107" name="TextBox 1106">
+            <a:extLst>
+              <a:ext uri="{FF2B5EF4-FFF2-40B4-BE49-F238E27FC236}">
+                <a16:creationId xmlns:a16="http://schemas.microsoft.com/office/drawing/2014/main" id="{CC838720-2107-50C0-7CFD-5D6E0BF271D5}"/>
+              </a:ext>
+            </a:extLst>
+          </p:cNvPr>
+          <p:cNvSpPr txBox="1"/>
+          <p:nvPr/>
+        </p:nvSpPr>
+        <p:spPr>
+          <a:xfrm>
+            <a:off x="9160808" y="2141382"/>
+            <a:ext cx="665494" cy="169277"/>
+          </a:xfrm>
+          <a:prstGeom prst="rect">
+            <a:avLst/>
+          </a:prstGeom>
+          <a:noFill/>
+        </p:spPr>
+        <p:txBody>
+          <a:bodyPr wrap="square" rtlCol="0">
+            <a:spAutoFit/>
+          </a:bodyPr>
+          <a:lstStyle/>
+          <a:p>
+            <a:r>
+              <a:rPr lang="en-US" altLang="zh-TW" sz="500" i="1" dirty="0"/>
+              <a:t>Save file()</a:t>
+            </a:r>
+            <a:endParaRPr lang="zh-TW" altLang="en-US" sz="500" i="1" dirty="0"/>
+          </a:p>
+        </p:txBody>
+      </p:sp>
+      <p:sp>
+        <p:nvSpPr>
+          <p:cNvPr id="1108" name="TextBox 1107">
+            <a:extLst>
+              <a:ext uri="{FF2B5EF4-FFF2-40B4-BE49-F238E27FC236}">
+                <a16:creationId xmlns:a16="http://schemas.microsoft.com/office/drawing/2014/main" id="{CD567173-FFEB-A424-806F-5BA3145DE36C}"/>
+              </a:ext>
+            </a:extLst>
+          </p:cNvPr>
+          <p:cNvSpPr txBox="1"/>
+          <p:nvPr/>
+        </p:nvSpPr>
+        <p:spPr>
+          <a:xfrm>
+            <a:off x="10195751" y="1285186"/>
+            <a:ext cx="665494" cy="153888"/>
+          </a:xfrm>
+          <a:prstGeom prst="rect">
+            <a:avLst/>
+          </a:prstGeom>
+          <a:noFill/>
+        </p:spPr>
+        <p:txBody>
+          <a:bodyPr wrap="square" rtlCol="0">
+            <a:spAutoFit/>
+          </a:bodyPr>
+          <a:lstStyle/>
+          <a:p>
+            <a:r>
+              <a:rPr lang="en-US" altLang="zh-TW" sz="400" i="1" dirty="0"/>
+              <a:t>Folder</a:t>
+            </a:r>
+            <a:endParaRPr lang="zh-TW" altLang="en-US" sz="400" i="1" dirty="0"/>
+          </a:p>
+        </p:txBody>
+      </p:sp>
+    </p:spTree>
+    <p:extLst>
+      <p:ext uri="{BB962C8B-B14F-4D97-AF65-F5344CB8AC3E}">
+        <p14:creationId xmlns:p14="http://schemas.microsoft.com/office/powerpoint/2010/main" val="3116105863"/>
+      </p:ext>
+    </p:extLst>
+  </p:cSld>
+  <p:clrMapOvr>
+    <a:masterClrMapping/>
+  </p:clrMapOvr>
+</p:sld>
+</file>
+
+<file path=ppt/slides/slide5.xml><?xml version="1.0" encoding="utf-8"?>
+<p:sld xmlns:a="http://schemas.openxmlformats.org/drawingml/2006/main" xmlns:r="http://schemas.openxmlformats.org/officeDocument/2006/relationships" xmlns:p="http://schemas.openxmlformats.org/presentationml/2006/main">
+  <p:cSld>
+    <p:spTree>
+      <p:nvGrpSpPr>
+        <p:cNvPr id="1" name="">
+          <a:extLst>
+            <a:ext uri="{FF2B5EF4-FFF2-40B4-BE49-F238E27FC236}">
               <a16:creationId xmlns:a16="http://schemas.microsoft.com/office/drawing/2014/main" id="{C84FB41A-5D64-8F8D-1F76-A067205EFD3F}"/>
             </a:ext>
           </a:extLst>
@@ -4440,7 +7301,7 @@
 </p:sld>
 </file>
 
-<file path=ppt/slides/slide5.xml><?xml version="1.0" encoding="utf-8"?>
+<file path=ppt/slides/slide6.xml><?xml version="1.0" encoding="utf-8"?>
 <p:sld xmlns:a="http://schemas.openxmlformats.org/drawingml/2006/main" xmlns:r="http://schemas.openxmlformats.org/officeDocument/2006/relationships" xmlns:p="http://schemas.openxmlformats.org/presentationml/2006/main">
   <p:cSld>
     <p:spTree>
@@ -4541,7 +7402,7 @@
 </p:sld>
 </file>
 
-<file path=ppt/slides/slide6.xml><?xml version="1.0" encoding="utf-8"?>
+<file path=ppt/slides/slide7.xml><?xml version="1.0" encoding="utf-8"?>
 <p:sld xmlns:a="http://schemas.openxmlformats.org/drawingml/2006/main" xmlns:r="http://schemas.openxmlformats.org/officeDocument/2006/relationships" xmlns:p="http://schemas.openxmlformats.org/presentationml/2006/main">
   <p:cSld>
     <p:spTree>

</xml_diff>